<commit_message>
[docs] add fuzz contents in the final doc
add fuzz contents in the final doc
</commit_message>
<xml_diff>
--- a/docs/phase2/03_vulnerabilities/V12/fuzz.pptx
+++ b/docs/phase2/03_vulnerabilities/V12/fuzz.pptx
@@ -1,6 +1,6 @@
 
 <file path=ppt/presentation.xml><?xml version="1.0" encoding="utf-8"?>
-<p:presentation xmlns:a="http://schemas.openxmlformats.org/drawingml/2006/main" xmlns:r="http://schemas.openxmlformats.org/officeDocument/2006/relationships" xmlns:p="http://schemas.openxmlformats.org/presentationml/2006/main" saveSubsetFonts="1">
+<p:presentation xmlns:a="http://schemas.openxmlformats.org/drawingml/2006/main" xmlns:r="http://schemas.openxmlformats.org/officeDocument/2006/relationships" xmlns:p="http://schemas.openxmlformats.org/presentationml/2006/main" embedTrueTypeFonts="1" saveSubsetFonts="1">
   <p:sldMasterIdLst>
     <p:sldMasterId id="2147483648" r:id="rId1"/>
   </p:sldMasterIdLst>
@@ -15,6 +15,20 @@
   </p:sldIdLst>
   <p:sldSz cx="12192000" cy="6858000"/>
   <p:notesSz cx="6858000" cy="9144000"/>
+  <p:embeddedFontLst>
+    <p:embeddedFont>
+      <p:font typeface="Consolas" panose="020B0609020204030204" pitchFamily="49" charset="0"/>
+      <p:regular r:id="rId7"/>
+      <p:bold r:id="rId8"/>
+      <p:italic r:id="rId9"/>
+      <p:boldItalic r:id="rId10"/>
+    </p:embeddedFont>
+    <p:embeddedFont>
+      <p:font typeface="맑은 고딕" panose="020B0503020000020004" pitchFamily="50" charset="-127"/>
+      <p:regular r:id="rId11"/>
+      <p:bold r:id="rId12"/>
+    </p:embeddedFont>
+  </p:embeddedFontLst>
   <p:defaultTextStyle>
     <a:defPPr>
       <a:defRPr lang="ko-KR"/>
@@ -110,6 +124,11 @@
       </a:defRPr>
     </a:lvl9pPr>
   </p:defaultTextStyle>
+  <p:extLst>
+    <p:ext uri="{EFAFB233-063F-42B5-8137-9DF3F51BA10A}">
+      <p15:sldGuideLst xmlns:p15="http://schemas.microsoft.com/office/powerpoint/2012/main"/>
+    </p:ext>
+  </p:extLst>
 </p:presentation>
 </file>
 
@@ -195,7 +214,7 @@
           <a:p>
             <a:fld id="{7B1BCF51-30CB-47BA-9D66-72CD0B8BB351}" type="datetimeFigureOut">
               <a:rPr lang="ko-KR" altLang="en-US" smtClean="0"/>
-              <a:t>2021-06-29</a:t>
+              <a:t>2021-06-30</a:t>
             </a:fld>
             <a:endParaRPr lang="ko-KR" altLang="en-US"/>
           </a:p>
@@ -1056,7 +1075,7 @@
           <a:p>
             <a:fld id="{12EC33C6-D80C-44BA-933F-8E49159C867A}" type="datetimeFigureOut">
               <a:rPr lang="ko-KR" altLang="en-US" smtClean="0"/>
-              <a:t>2021-06-29</a:t>
+              <a:t>2021-06-30</a:t>
             </a:fld>
             <a:endParaRPr lang="ko-KR" altLang="en-US"/>
           </a:p>
@@ -1226,7 +1245,7 @@
           <a:p>
             <a:fld id="{12EC33C6-D80C-44BA-933F-8E49159C867A}" type="datetimeFigureOut">
               <a:rPr lang="ko-KR" altLang="en-US" smtClean="0"/>
-              <a:t>2021-06-29</a:t>
+              <a:t>2021-06-30</a:t>
             </a:fld>
             <a:endParaRPr lang="ko-KR" altLang="en-US"/>
           </a:p>
@@ -1406,7 +1425,7 @@
           <a:p>
             <a:fld id="{12EC33C6-D80C-44BA-933F-8E49159C867A}" type="datetimeFigureOut">
               <a:rPr lang="ko-KR" altLang="en-US" smtClean="0"/>
-              <a:t>2021-06-29</a:t>
+              <a:t>2021-06-30</a:t>
             </a:fld>
             <a:endParaRPr lang="ko-KR" altLang="en-US"/>
           </a:p>
@@ -1879,7 +1898,7 @@
           <a:p>
             <a:fld id="{12EC33C6-D80C-44BA-933F-8E49159C867A}" type="datetimeFigureOut">
               <a:rPr lang="ko-KR" altLang="en-US" smtClean="0"/>
-              <a:t>2021-06-29</a:t>
+              <a:t>2021-06-30</a:t>
             </a:fld>
             <a:endParaRPr lang="ko-KR" altLang="en-US"/>
           </a:p>
@@ -2125,7 +2144,7 @@
           <a:p>
             <a:fld id="{12EC33C6-D80C-44BA-933F-8E49159C867A}" type="datetimeFigureOut">
               <a:rPr lang="ko-KR" altLang="en-US" smtClean="0"/>
-              <a:t>2021-06-29</a:t>
+              <a:t>2021-06-30</a:t>
             </a:fld>
             <a:endParaRPr lang="ko-KR" altLang="en-US"/>
           </a:p>
@@ -2357,7 +2376,7 @@
           <a:p>
             <a:fld id="{12EC33C6-D80C-44BA-933F-8E49159C867A}" type="datetimeFigureOut">
               <a:rPr lang="ko-KR" altLang="en-US" smtClean="0"/>
-              <a:t>2021-06-29</a:t>
+              <a:t>2021-06-30</a:t>
             </a:fld>
             <a:endParaRPr lang="ko-KR" altLang="en-US"/>
           </a:p>
@@ -2724,7 +2743,7 @@
           <a:p>
             <a:fld id="{12EC33C6-D80C-44BA-933F-8E49159C867A}" type="datetimeFigureOut">
               <a:rPr lang="ko-KR" altLang="en-US" smtClean="0"/>
-              <a:t>2021-06-29</a:t>
+              <a:t>2021-06-30</a:t>
             </a:fld>
             <a:endParaRPr lang="ko-KR" altLang="en-US"/>
           </a:p>
@@ -2842,7 +2861,7 @@
           <a:p>
             <a:fld id="{12EC33C6-D80C-44BA-933F-8E49159C867A}" type="datetimeFigureOut">
               <a:rPr lang="ko-KR" altLang="en-US" smtClean="0"/>
-              <a:t>2021-06-29</a:t>
+              <a:t>2021-06-30</a:t>
             </a:fld>
             <a:endParaRPr lang="ko-KR" altLang="en-US"/>
           </a:p>
@@ -2937,7 +2956,7 @@
           <a:p>
             <a:fld id="{12EC33C6-D80C-44BA-933F-8E49159C867A}" type="datetimeFigureOut">
               <a:rPr lang="ko-KR" altLang="en-US" smtClean="0"/>
-              <a:t>2021-06-29</a:t>
+              <a:t>2021-06-30</a:t>
             </a:fld>
             <a:endParaRPr lang="ko-KR" altLang="en-US"/>
           </a:p>
@@ -3214,7 +3233,7 @@
           <a:p>
             <a:fld id="{12EC33C6-D80C-44BA-933F-8E49159C867A}" type="datetimeFigureOut">
               <a:rPr lang="ko-KR" altLang="en-US" smtClean="0"/>
-              <a:t>2021-06-29</a:t>
+              <a:t>2021-06-30</a:t>
             </a:fld>
             <a:endParaRPr lang="ko-KR" altLang="en-US"/>
           </a:p>
@@ -3467,7 +3486,7 @@
           <a:p>
             <a:fld id="{12EC33C6-D80C-44BA-933F-8E49159C867A}" type="datetimeFigureOut">
               <a:rPr lang="ko-KR" altLang="en-US" smtClean="0"/>
-              <a:t>2021-06-29</a:t>
+              <a:t>2021-06-30</a:t>
             </a:fld>
             <a:endParaRPr lang="ko-KR" altLang="en-US"/>
           </a:p>
@@ -3680,7 +3699,7 @@
           <a:p>
             <a:fld id="{12EC33C6-D80C-44BA-933F-8E49159C867A}" type="datetimeFigureOut">
               <a:rPr lang="ko-KR" altLang="en-US" smtClean="0"/>
-              <a:t>2021-06-29</a:t>
+              <a:t>2021-06-30</a:t>
             </a:fld>
             <a:endParaRPr lang="ko-KR" altLang="en-US"/>
           </a:p>
@@ -4094,7 +4113,7 @@
         </p:nvSpPr>
         <p:spPr>
           <a:xfrm>
-            <a:off x="5649751" y="627054"/>
+            <a:off x="5919926" y="627054"/>
             <a:ext cx="914400" cy="719019"/>
           </a:xfrm>
           <a:prstGeom prst="rect">
@@ -4135,7 +4154,7 @@
         </p:nvSpPr>
         <p:spPr>
           <a:xfrm>
-            <a:off x="7824782" y="627054"/>
+            <a:off x="8094957" y="627054"/>
             <a:ext cx="914400" cy="719019"/>
           </a:xfrm>
           <a:prstGeom prst="rect">
@@ -4184,7 +4203,7 @@
         </p:nvSpPr>
         <p:spPr>
           <a:xfrm>
-            <a:off x="6457620" y="692657"/>
+            <a:off x="6727795" y="692657"/>
             <a:ext cx="1473693" cy="572423"/>
           </a:xfrm>
           <a:prstGeom prst="flowChartMagneticDrum">
@@ -4222,7 +4241,7 @@
         </p:nvCxnSpPr>
         <p:spPr>
           <a:xfrm flipH="1">
-            <a:off x="6457620" y="1136284"/>
+            <a:off x="6727795" y="1136284"/>
             <a:ext cx="1367162" cy="0"/>
           </a:xfrm>
           <a:prstGeom prst="straightConnector1">
@@ -4258,7 +4277,7 @@
         </p:nvSpPr>
         <p:spPr>
           <a:xfrm>
-            <a:off x="6417669" y="786317"/>
+            <a:off x="6687844" y="786317"/>
             <a:ext cx="1513644" cy="326718"/>
           </a:xfrm>
           <a:prstGeom prst="rect">
@@ -4302,7 +4321,7 @@
         </p:nvSpPr>
         <p:spPr>
           <a:xfrm>
-            <a:off x="5649751" y="1620418"/>
+            <a:off x="5919926" y="1620418"/>
             <a:ext cx="914400" cy="719019"/>
           </a:xfrm>
           <a:prstGeom prst="rect">
@@ -4343,7 +4362,7 @@
         </p:nvSpPr>
         <p:spPr>
           <a:xfrm>
-            <a:off x="7824782" y="1620418"/>
+            <a:off x="8094957" y="1620418"/>
             <a:ext cx="914400" cy="719019"/>
           </a:xfrm>
           <a:prstGeom prst="rect">
@@ -4401,7 +4420,7 @@
         </p:nvSpPr>
         <p:spPr>
           <a:xfrm>
-            <a:off x="6457620" y="1686021"/>
+            <a:off x="6727795" y="1686021"/>
             <a:ext cx="1473693" cy="572423"/>
           </a:xfrm>
           <a:prstGeom prst="flowChartMagneticDrum">
@@ -4439,7 +4458,7 @@
         </p:nvCxnSpPr>
         <p:spPr>
           <a:xfrm flipH="1">
-            <a:off x="6457620" y="2129649"/>
+            <a:off x="6727795" y="2129649"/>
             <a:ext cx="1367162" cy="0"/>
           </a:xfrm>
           <a:prstGeom prst="straightConnector1">
@@ -4475,7 +4494,7 @@
         </p:nvSpPr>
         <p:spPr>
           <a:xfrm>
-            <a:off x="6384379" y="1743116"/>
+            <a:off x="6654554" y="1743116"/>
             <a:ext cx="1513644" cy="326718"/>
           </a:xfrm>
           <a:prstGeom prst="rect">
@@ -4527,7 +4546,7 @@
         </p:nvSpPr>
         <p:spPr>
           <a:xfrm>
-            <a:off x="6049248" y="2063186"/>
+            <a:off x="6319423" y="2063186"/>
             <a:ext cx="914400" cy="719019"/>
           </a:xfrm>
           <a:prstGeom prst="irregularSeal1">
@@ -4570,7 +4589,7 @@
         <p:spPr>
           <a:xfrm>
             <a:off x="381142" y="596771"/>
-            <a:ext cx="5035255" cy="2677656"/>
+            <a:ext cx="5162078" cy="2677656"/>
           </a:xfrm>
           <a:prstGeom prst="rect">
             <a:avLst/>
@@ -4712,50 +4731,56 @@
               <a:rPr lang="en-US" altLang="ko-KR" sz="1200" dirty="0" smtClean="0">
                 <a:latin typeface="Consolas" panose="020B0609020204030204" pitchFamily="49" charset="0"/>
               </a:rPr>
-              <a:t>     exit </a:t>
-            </a:r>
-            <a:r>
-              <a:rPr lang="en-US" altLang="ko-KR" sz="1200" dirty="0" smtClean="0">
-                <a:latin typeface="Consolas" panose="020B0609020204030204" pitchFamily="49" charset="0"/>
-              </a:rPr>
-              <a:t>// = crash = server doesn’t work</a:t>
-            </a:r>
+              <a:t>     exit // = crash = server doesn’t work</a:t>
+            </a:r>
+          </a:p>
+          <a:p>
             <a:endParaRPr lang="en-US" altLang="ko-KR" sz="1200" dirty="0" smtClean="0">
               <a:latin typeface="Consolas" panose="020B0609020204030204" pitchFamily="49" charset="0"/>
             </a:endParaRPr>
           </a:p>
           <a:p>
+            <a:r>
+              <a:rPr lang="en-US" altLang="ko-KR" sz="1200" dirty="0" smtClean="0">
+                <a:latin typeface="Consolas" panose="020B0609020204030204" pitchFamily="49" charset="0"/>
+              </a:rPr>
+              <a:t>    save the fuzzed packets into ./</a:t>
+            </a:r>
+            <a:r>
+              <a:rPr lang="en-US" altLang="ko-KR" sz="1200" dirty="0" err="1" smtClean="0">
+                <a:latin typeface="Consolas" panose="020B0609020204030204" pitchFamily="49" charset="0"/>
+              </a:rPr>
+              <a:t>fuzz_packet</a:t>
+            </a:r>
+            <a:r>
+              <a:rPr lang="en-US" altLang="ko-KR" sz="1200" dirty="0" smtClean="0">
+                <a:latin typeface="Consolas" panose="020B0609020204030204" pitchFamily="49" charset="0"/>
+              </a:rPr>
+              <a:t> path</a:t>
+            </a:r>
+          </a:p>
+          <a:p>
+            <a:r>
+              <a:rPr lang="en-US" altLang="ko-KR" sz="1200" dirty="0" smtClean="0">
+                <a:latin typeface="Consolas" panose="020B0609020204030204" pitchFamily="49" charset="0"/>
+              </a:rPr>
+              <a:t>    // the packets will be used when reproducing </a:t>
+            </a:r>
+            <a:r>
+              <a:rPr lang="en-US" altLang="ko-KR" sz="1200" dirty="0" smtClean="0">
+                <a:latin typeface="Consolas" panose="020B0609020204030204" pitchFamily="49" charset="0"/>
+              </a:rPr>
+              <a:t>the </a:t>
+            </a:r>
+            <a:r>
+              <a:rPr lang="en-US" altLang="ko-KR" sz="1200" dirty="0" smtClean="0">
+                <a:latin typeface="Consolas" panose="020B0609020204030204" pitchFamily="49" charset="0"/>
+              </a:rPr>
+              <a:t>crash</a:t>
+            </a:r>
             <a:endParaRPr lang="en-US" altLang="ko-KR" sz="1200" dirty="0" smtClean="0">
               <a:latin typeface="Consolas" panose="020B0609020204030204" pitchFamily="49" charset="0"/>
             </a:endParaRPr>
-          </a:p>
-          <a:p>
-            <a:r>
-              <a:rPr lang="en-US" altLang="ko-KR" sz="1200" dirty="0" smtClean="0">
-                <a:latin typeface="Consolas" panose="020B0609020204030204" pitchFamily="49" charset="0"/>
-              </a:rPr>
-              <a:t>    save the fuzzed packets into ./</a:t>
-            </a:r>
-            <a:r>
-              <a:rPr lang="en-US" altLang="ko-KR" sz="1200" dirty="0" err="1" smtClean="0">
-                <a:latin typeface="Consolas" panose="020B0609020204030204" pitchFamily="49" charset="0"/>
-              </a:rPr>
-              <a:t>fuzz_packet</a:t>
-            </a:r>
-            <a:r>
-              <a:rPr lang="en-US" altLang="ko-KR" sz="1200" dirty="0" smtClean="0">
-                <a:latin typeface="Consolas" panose="020B0609020204030204" pitchFamily="49" charset="0"/>
-              </a:rPr>
-              <a:t> path</a:t>
-            </a:r>
-          </a:p>
-          <a:p>
-            <a:r>
-              <a:rPr lang="en-US" altLang="ko-KR" sz="1200" dirty="0" smtClean="0">
-                <a:latin typeface="Consolas" panose="020B0609020204030204" pitchFamily="49" charset="0"/>
-              </a:rPr>
-              <a:t>    // the packets will be used when reproducing crash</a:t>
-            </a:r>
           </a:p>
         </p:txBody>
       </p:sp>
@@ -4809,7 +4834,7 @@
         <p:spPr>
           <a:xfrm>
             <a:off x="381141" y="3519017"/>
-            <a:ext cx="6622743" cy="3231654"/>
+            <a:ext cx="6622743" cy="2677656"/>
           </a:xfrm>
           <a:prstGeom prst="rect">
             <a:avLst/>
@@ -4842,6 +4867,60 @@
           </a:p>
           <a:p>
             <a:r>
+              <a:rPr lang="en-US" altLang="ko-KR" sz="1200" dirty="0" smtClean="0">
+                <a:latin typeface="Consolas" panose="020B0609020204030204" pitchFamily="49" charset="0"/>
+              </a:rPr>
+              <a:t>from </a:t>
+            </a:r>
+            <a:r>
+              <a:rPr lang="en-US" altLang="ko-KR" sz="1200" b="1" i="1" dirty="0" err="1">
+                <a:latin typeface="Consolas" panose="020B0609020204030204" pitchFamily="49" charset="0"/>
+              </a:rPr>
+              <a:t>scapy</a:t>
+            </a:r>
+            <a:r>
+              <a:rPr lang="en-US" altLang="ko-KR" sz="1200" dirty="0" err="1">
+                <a:latin typeface="Consolas" panose="020B0609020204030204" pitchFamily="49" charset="0"/>
+              </a:rPr>
+              <a:t>.all</a:t>
+            </a:r>
+            <a:r>
+              <a:rPr lang="en-US" altLang="ko-KR" sz="1200" dirty="0">
+                <a:latin typeface="Consolas" panose="020B0609020204030204" pitchFamily="49" charset="0"/>
+              </a:rPr>
+              <a:t> import </a:t>
+            </a:r>
+            <a:r>
+              <a:rPr lang="en-US" altLang="ko-KR" sz="1200" dirty="0" smtClean="0">
+                <a:latin typeface="Consolas" panose="020B0609020204030204" pitchFamily="49" charset="0"/>
+              </a:rPr>
+              <a:t>*</a:t>
+            </a:r>
+          </a:p>
+          <a:p>
+            <a:r>
+              <a:rPr lang="en-US" altLang="ko-KR" sz="1200" dirty="0">
+                <a:latin typeface="Consolas" panose="020B0609020204030204" pitchFamily="49" charset="0"/>
+              </a:rPr>
+              <a:t>import </a:t>
+            </a:r>
+            <a:r>
+              <a:rPr lang="en-US" altLang="ko-KR" sz="1200" b="1" i="1" dirty="0">
+                <a:latin typeface="Consolas" panose="020B0609020204030204" pitchFamily="49" charset="0"/>
+              </a:rPr>
+              <a:t>random</a:t>
+            </a:r>
+            <a:endParaRPr lang="en-US" altLang="ko-KR" sz="1200" b="1" i="1" dirty="0" smtClean="0">
+              <a:latin typeface="Consolas" panose="020B0609020204030204" pitchFamily="49" charset="0"/>
+            </a:endParaRPr>
+          </a:p>
+          <a:p>
+            <a:endParaRPr lang="en-US" altLang="ko-KR" sz="1200" dirty="0" smtClean="0">
+              <a:latin typeface="Consolas" panose="020B0609020204030204" pitchFamily="49" charset="0"/>
+            </a:endParaRPr>
+          </a:p>
+          <a:p>
+            <a:r>
               <a:rPr lang="en-US" altLang="ko-KR" sz="1200" dirty="0" err="1" smtClean="0">
                 <a:latin typeface="Consolas" panose="020B0609020204030204" pitchFamily="49" charset="0"/>
               </a:rPr>
@@ -4851,7 +4930,13 @@
               <a:rPr lang="en-US" altLang="ko-KR" sz="1200" dirty="0" smtClean="0">
                 <a:latin typeface="Consolas" panose="020B0609020204030204" pitchFamily="49" charset="0"/>
               </a:rPr>
-              <a:t> = 0 or 16</a:t>
+              <a:t> </a:t>
+            </a:r>
+            <a:r>
+              <a:rPr lang="en-US" altLang="ko-KR" sz="1200" dirty="0" smtClean="0">
+                <a:latin typeface="Consolas" panose="020B0609020204030204" pitchFamily="49" charset="0"/>
+              </a:rPr>
+              <a:t>= 0 or 16</a:t>
             </a:r>
           </a:p>
           <a:p>
@@ -5058,135 +5143,9 @@
               </a:rPr>
               <a:t>)))</a:t>
             </a:r>
-          </a:p>
-          <a:p>
             <a:endParaRPr lang="en-US" altLang="ko-KR" sz="1200" dirty="0" smtClean="0">
               <a:latin typeface="Consolas" panose="020B0609020204030204" pitchFamily="49" charset="0"/>
             </a:endParaRPr>
-          </a:p>
-          <a:p>
-            <a:r>
-              <a:rPr lang="en-US" altLang="ko-KR" sz="1200" dirty="0" smtClean="0">
-                <a:latin typeface="Consolas" panose="020B0609020204030204" pitchFamily="49" charset="0"/>
-              </a:rPr>
-              <a:t>p = fuzz(Raw(load="SB1T"))/ \</a:t>
-            </a:r>
-          </a:p>
-          <a:p>
-            <a:r>
-              <a:rPr lang="en-US" altLang="ko-KR" sz="1200" dirty="0" smtClean="0">
-                <a:latin typeface="Consolas" panose="020B0609020204030204" pitchFamily="49" charset="0"/>
-              </a:rPr>
-              <a:t>      Raw(load=(</a:t>
-            </a:r>
-            <a:r>
-              <a:rPr lang="en-US" altLang="ko-KR" sz="1200" dirty="0" err="1" smtClean="0">
-                <a:latin typeface="Consolas" panose="020B0609020204030204" pitchFamily="49" charset="0"/>
-              </a:rPr>
-              <a:t>payload_len</a:t>
-            </a:r>
-            <a:r>
-              <a:rPr lang="en-US" altLang="ko-KR" sz="1200" dirty="0" smtClean="0">
-                <a:latin typeface="Consolas" panose="020B0609020204030204" pitchFamily="49" charset="0"/>
-              </a:rPr>
-              <a:t> + </a:t>
-            </a:r>
-            <a:r>
-              <a:rPr lang="en-US" altLang="ko-KR" sz="1200" dirty="0" err="1" smtClean="0">
-                <a:latin typeface="Consolas" panose="020B0609020204030204" pitchFamily="49" charset="0"/>
-              </a:rPr>
-              <a:t>head_len</a:t>
-            </a:r>
-            <a:r>
-              <a:rPr lang="en-US" altLang="ko-KR" sz="1200" dirty="0" smtClean="0">
-                <a:latin typeface="Consolas" panose="020B0609020204030204" pitchFamily="49" charset="0"/>
-              </a:rPr>
-              <a:t>).</a:t>
-            </a:r>
-            <a:r>
-              <a:rPr lang="en-US" altLang="ko-KR" sz="1200" dirty="0" err="1" smtClean="0">
-                <a:latin typeface="Consolas" panose="020B0609020204030204" pitchFamily="49" charset="0"/>
-              </a:rPr>
-              <a:t>to_bytes</a:t>
-            </a:r>
-            <a:r>
-              <a:rPr lang="en-US" altLang="ko-KR" sz="1200" dirty="0" smtClean="0">
-                <a:latin typeface="Consolas" panose="020B0609020204030204" pitchFamily="49" charset="0"/>
-              </a:rPr>
-              <a:t>(4, 'little'))/ \</a:t>
-            </a:r>
-          </a:p>
-          <a:p>
-            <a:r>
-              <a:rPr lang="en-US" altLang="ko-KR" sz="1200" dirty="0" smtClean="0">
-                <a:latin typeface="Consolas" panose="020B0609020204030204" pitchFamily="49" charset="0"/>
-              </a:rPr>
-              <a:t>      fuzz(Raw(</a:t>
-            </a:r>
-            <a:r>
-              <a:rPr lang="en-US" altLang="ko-KR" sz="1200" dirty="0" err="1" smtClean="0">
-                <a:latin typeface="Consolas" panose="020B0609020204030204" pitchFamily="49" charset="0"/>
-              </a:rPr>
-              <a:t>RandBin</a:t>
-            </a:r>
-            <a:r>
-              <a:rPr lang="en-US" altLang="ko-KR" sz="1200" dirty="0" smtClean="0">
-                <a:latin typeface="Consolas" panose="020B0609020204030204" pitchFamily="49" charset="0"/>
-              </a:rPr>
-              <a:t>(size = 4)))/ \</a:t>
-            </a:r>
-          </a:p>
-          <a:p>
-            <a:r>
-              <a:rPr lang="en-US" altLang="ko-KR" sz="1200" dirty="0" smtClean="0">
-                <a:latin typeface="Consolas" panose="020B0609020204030204" pitchFamily="49" charset="0"/>
-              </a:rPr>
-              <a:t>      Raw(load=</a:t>
-            </a:r>
-            <a:r>
-              <a:rPr lang="en-US" altLang="ko-KR" sz="1200" dirty="0" err="1" smtClean="0">
-                <a:latin typeface="Consolas" panose="020B0609020204030204" pitchFamily="49" charset="0"/>
-              </a:rPr>
-              <a:t>msgtype</a:t>
-            </a:r>
-            <a:r>
-              <a:rPr lang="en-US" altLang="ko-KR" sz="1200" dirty="0" smtClean="0">
-                <a:latin typeface="Consolas" panose="020B0609020204030204" pitchFamily="49" charset="0"/>
-              </a:rPr>
-              <a:t>)/ \</a:t>
-            </a:r>
-          </a:p>
-          <a:p>
-            <a:r>
-              <a:rPr lang="en-US" altLang="ko-KR" sz="1200" dirty="0" smtClean="0">
-                <a:latin typeface="Consolas" panose="020B0609020204030204" pitchFamily="49" charset="0"/>
-              </a:rPr>
-              <a:t>      fuzz(Raw(</a:t>
-            </a:r>
-            <a:r>
-              <a:rPr lang="en-US" altLang="ko-KR" sz="1200" dirty="0" err="1" smtClean="0">
-                <a:latin typeface="Consolas" panose="020B0609020204030204" pitchFamily="49" charset="0"/>
-              </a:rPr>
-              <a:t>RandBin</a:t>
-            </a:r>
-            <a:r>
-              <a:rPr lang="en-US" altLang="ko-KR" sz="1200" dirty="0" smtClean="0">
-                <a:latin typeface="Consolas" panose="020B0609020204030204" pitchFamily="49" charset="0"/>
-              </a:rPr>
-              <a:t>(size=</a:t>
-            </a:r>
-            <a:r>
-              <a:rPr lang="en-US" altLang="ko-KR" sz="1200" dirty="0" err="1" smtClean="0">
-                <a:latin typeface="Consolas" panose="020B0609020204030204" pitchFamily="49" charset="0"/>
-              </a:rPr>
-              <a:t>payload_len</a:t>
-            </a:r>
-            <a:r>
-              <a:rPr lang="en-US" altLang="ko-KR" sz="1200" dirty="0" smtClean="0">
-                <a:latin typeface="Consolas" panose="020B0609020204030204" pitchFamily="49" charset="0"/>
-              </a:rPr>
-              <a:t>)))</a:t>
-            </a:r>
           </a:p>
         </p:txBody>
       </p:sp>
@@ -5352,7 +5311,7 @@
         </p:nvSpPr>
         <p:spPr>
           <a:xfrm>
-            <a:off x="764153" y="4683532"/>
+            <a:off x="764153" y="5239289"/>
             <a:ext cx="6120000" cy="144000"/>
           </a:xfrm>
           <a:prstGeom prst="rect">
@@ -5417,7 +5376,7 @@
         </p:nvSpPr>
         <p:spPr>
           <a:xfrm>
-            <a:off x="764153" y="4871558"/>
+            <a:off x="764153" y="5427315"/>
             <a:ext cx="6120000" cy="144000"/>
           </a:xfrm>
           <a:prstGeom prst="rect">
@@ -5482,7 +5441,7 @@
         </p:nvSpPr>
         <p:spPr>
           <a:xfrm>
-            <a:off x="764153" y="5047709"/>
+            <a:off x="764153" y="5603466"/>
             <a:ext cx="6120000" cy="144000"/>
           </a:xfrm>
           <a:prstGeom prst="rect">
@@ -5547,7 +5506,7 @@
         </p:nvSpPr>
         <p:spPr>
           <a:xfrm>
-            <a:off x="764153" y="5235735"/>
+            <a:off x="764153" y="5791492"/>
             <a:ext cx="6120000" cy="144000"/>
           </a:xfrm>
           <a:prstGeom prst="rect">
@@ -5612,7 +5571,7 @@
         </p:nvSpPr>
         <p:spPr>
           <a:xfrm>
-            <a:off x="764153" y="5411886"/>
+            <a:off x="764153" y="5967643"/>
             <a:ext cx="6120000" cy="144000"/>
           </a:xfrm>
           <a:prstGeom prst="rect">
@@ -5790,16 +5749,10 @@
           </a:p>
           <a:p>
             <a:r>
-              <a:rPr lang="en-US" altLang="ko-KR" sz="1100" dirty="0">
-                <a:latin typeface="Consolas" panose="020B0609020204030204" pitchFamily="49" charset="0"/>
-              </a:rPr>
-              <a:t> </a:t>
-            </a:r>
-            <a:r>
               <a:rPr lang="en-US" altLang="ko-KR" sz="1100" dirty="0" smtClean="0">
                 <a:latin typeface="Consolas" panose="020B0609020204030204" pitchFamily="49" charset="0"/>
               </a:rPr>
-              <a:t> </a:t>
+              <a:t>  </a:t>
             </a:r>
             <a:r>
               <a:rPr lang="en-US" altLang="ko-KR" sz="1100" dirty="0" smtClean="0">
@@ -5808,39 +5761,15 @@
                 </a:solidFill>
                 <a:latin typeface="Consolas" panose="020B0609020204030204" pitchFamily="49" charset="0"/>
               </a:rPr>
-              <a:t>[Length – </a:t>
-            </a:r>
+              <a:t>[Length – Random in range 1~100, 4 bytes, indicating protocol message]</a:t>
+            </a:r>
+          </a:p>
+          <a:p>
             <a:r>
               <a:rPr lang="en-US" altLang="ko-KR" sz="1100" dirty="0" smtClean="0">
-                <a:solidFill>
-                  <a:srgbClr val="00B050"/>
-                </a:solidFill>
-                <a:latin typeface="Consolas" panose="020B0609020204030204" pitchFamily="49" charset="0"/>
-              </a:rPr>
-              <a:t>Random in range 1~100, 4 bytes, indicating </a:t>
-            </a:r>
-            <a:r>
-              <a:rPr lang="en-US" altLang="ko-KR" sz="1100" dirty="0" smtClean="0">
-                <a:solidFill>
-                  <a:srgbClr val="00B050"/>
-                </a:solidFill>
-                <a:latin typeface="Consolas" panose="020B0609020204030204" pitchFamily="49" charset="0"/>
-              </a:rPr>
-              <a:t>protocol message]</a:t>
-            </a:r>
-          </a:p>
-          <a:p>
-            <a:r>
-              <a:rPr lang="en-US" altLang="ko-KR" sz="1100" dirty="0">
-                <a:latin typeface="Consolas" panose="020B0609020204030204" pitchFamily="49" charset="0"/>
-              </a:rPr>
-              <a:t> </a:t>
-            </a:r>
-            <a:r>
-              <a:rPr lang="en-US" altLang="ko-KR" sz="1100" dirty="0" smtClean="0">
-                <a:latin typeface="Consolas" panose="020B0609020204030204" pitchFamily="49" charset="0"/>
-              </a:rPr>
-              <a:t> </a:t>
+                <a:latin typeface="Consolas" panose="020B0609020204030204" pitchFamily="49" charset="0"/>
+              </a:rPr>
+              <a:t>  </a:t>
             </a:r>
             <a:r>
               <a:rPr lang="en-US" altLang="ko-KR" sz="1100" dirty="0" smtClean="0">
@@ -5854,16 +5783,10 @@
           </a:p>
           <a:p>
             <a:r>
-              <a:rPr lang="en-US" altLang="ko-KR" sz="1100" dirty="0">
-                <a:latin typeface="Consolas" panose="020B0609020204030204" pitchFamily="49" charset="0"/>
-              </a:rPr>
-              <a:t> </a:t>
-            </a:r>
-            <a:r>
               <a:rPr lang="en-US" altLang="ko-KR" sz="1100" dirty="0" smtClean="0">
                 <a:latin typeface="Consolas" panose="020B0609020204030204" pitchFamily="49" charset="0"/>
               </a:rPr>
-              <a:t> </a:t>
+              <a:t>  </a:t>
             </a:r>
             <a:r>
               <a:rPr lang="en-US" altLang="ko-KR" sz="1100" dirty="0" smtClean="0">
@@ -5877,16 +5800,10 @@
           </a:p>
           <a:p>
             <a:r>
-              <a:rPr lang="en-US" altLang="ko-KR" sz="1100" dirty="0">
-                <a:latin typeface="Consolas" panose="020B0609020204030204" pitchFamily="49" charset="0"/>
-              </a:rPr>
-              <a:t> </a:t>
-            </a:r>
-            <a:r>
               <a:rPr lang="en-US" altLang="ko-KR" sz="1100" dirty="0" smtClean="0">
                 <a:latin typeface="Consolas" panose="020B0609020204030204" pitchFamily="49" charset="0"/>
               </a:rPr>
-              <a:t> </a:t>
+              <a:t>  </a:t>
             </a:r>
             <a:r>
               <a:rPr lang="en-US" altLang="ko-KR" sz="1100" dirty="0" smtClean="0">
@@ -7154,8 +7071,8 @@
         </p:nvSpPr>
         <p:spPr>
           <a:xfrm>
-            <a:off x="3279698" y="644348"/>
-            <a:ext cx="605550" cy="276999"/>
+            <a:off x="5645971" y="917993"/>
+            <a:ext cx="635239" cy="276999"/>
           </a:xfrm>
           <a:prstGeom prst="rect">
             <a:avLst/>
@@ -7170,10 +7087,22 @@
           <a:p>
             <a:pPr algn="ctr"/>
             <a:r>
-              <a:rPr lang="en-US" altLang="ko-KR" sz="1200" dirty="0" smtClean="0"/>
+              <a:rPr lang="en-US" altLang="ko-KR" sz="1200" b="1" i="1" u="sng" dirty="0" smtClean="0">
+                <a:solidFill>
+                  <a:schemeClr val="accent1">
+                    <a:lumMod val="50000"/>
+                  </a:schemeClr>
+                </a:solidFill>
+              </a:rPr>
               <a:t>server</a:t>
             </a:r>
-            <a:endParaRPr lang="ko-KR" altLang="en-US" sz="1200" dirty="0"/>
+            <a:endParaRPr lang="ko-KR" altLang="en-US" sz="1200" b="1" i="1" u="sng" dirty="0">
+              <a:solidFill>
+                <a:schemeClr val="accent1">
+                  <a:lumMod val="50000"/>
+                </a:schemeClr>
+              </a:solidFill>
+            </a:endParaRPr>
           </a:p>
         </p:txBody>
       </p:sp>
@@ -7185,8 +7114,8 @@
         </p:nvSpPr>
         <p:spPr>
           <a:xfrm>
-            <a:off x="7778087" y="644347"/>
-            <a:ext cx="2725747" cy="276999"/>
+            <a:off x="9398187" y="914825"/>
+            <a:ext cx="2004523" cy="461665"/>
           </a:xfrm>
           <a:prstGeom prst="rect">
             <a:avLst/>
@@ -7199,12 +7128,47 @@
           </a:bodyPr>
           <a:lstStyle/>
           <a:p>
-            <a:pPr algn="ctr"/>
-            <a:r>
-              <a:rPr lang="en-US" altLang="ko-KR" sz="1200" dirty="0" smtClean="0"/>
-              <a:t>attacker - python3 fuzz_tartan.py 16</a:t>
-            </a:r>
-            <a:endParaRPr lang="ko-KR" altLang="en-US" sz="1200" dirty="0"/>
+            <a:pPr algn="r"/>
+            <a:r>
+              <a:rPr lang="en-US" altLang="ko-KR" sz="1200" b="1" i="1" u="sng" dirty="0" smtClean="0">
+                <a:solidFill>
+                  <a:schemeClr val="accent1">
+                    <a:lumMod val="50000"/>
+                  </a:schemeClr>
+                </a:solidFill>
+              </a:rPr>
+              <a:t>attacker</a:t>
+            </a:r>
+          </a:p>
+          <a:p>
+            <a:pPr algn="r"/>
+            <a:r>
+              <a:rPr lang="en-US" altLang="ko-KR" sz="1200" dirty="0" smtClean="0">
+                <a:solidFill>
+                  <a:schemeClr val="accent1">
+                    <a:lumMod val="50000"/>
+                  </a:schemeClr>
+                </a:solidFill>
+              </a:rPr>
+              <a:t>python3 </a:t>
+            </a:r>
+            <a:r>
+              <a:rPr lang="en-US" altLang="ko-KR" sz="1200" dirty="0" smtClean="0">
+                <a:solidFill>
+                  <a:schemeClr val="accent1">
+                    <a:lumMod val="50000"/>
+                  </a:schemeClr>
+                </a:solidFill>
+              </a:rPr>
+              <a:t>fuzz_tartan.py 16</a:t>
+            </a:r>
+            <a:endParaRPr lang="ko-KR" altLang="en-US" sz="1200" dirty="0">
+              <a:solidFill>
+                <a:schemeClr val="accent1">
+                  <a:lumMod val="50000"/>
+                </a:schemeClr>
+              </a:solidFill>
+            </a:endParaRPr>
           </a:p>
         </p:txBody>
       </p:sp>
@@ -7217,338 +7181,7 @@
         <p:spPr>
           <a:xfrm>
             <a:off x="458759" y="914825"/>
-            <a:ext cx="6096000" cy="2723823"/>
-          </a:xfrm>
-          <a:prstGeom prst="rect">
-            <a:avLst/>
-          </a:prstGeom>
-          <a:ln>
-            <a:solidFill>
-              <a:schemeClr val="bg1">
-                <a:lumMod val="75000"/>
-              </a:schemeClr>
-            </a:solidFill>
-          </a:ln>
-        </p:spPr>
-        <p:txBody>
-          <a:bodyPr>
-            <a:spAutoFit/>
-          </a:bodyPr>
-          <a:lstStyle/>
-          <a:p>
-            <a:r>
-              <a:rPr lang="en-US" altLang="ko-KR" sz="900" dirty="0" err="1" smtClean="0">
-                <a:latin typeface="Consolas" panose="020B0609020204030204" pitchFamily="49" charset="0"/>
-              </a:rPr>
-              <a:t>pkt</a:t>
-            </a:r>
-            <a:r>
-              <a:rPr lang="en-US" altLang="ko-KR" sz="900" dirty="0" smtClean="0">
-                <a:latin typeface="Consolas" panose="020B0609020204030204" pitchFamily="49" charset="0"/>
-              </a:rPr>
-              <a:t> header : length=83  head=[SB1T]</a:t>
-            </a:r>
-          </a:p>
-          <a:p>
-            <a:r>
-              <a:rPr lang="en-US" altLang="ko-KR" sz="900" dirty="0" err="1" smtClean="0">
-                <a:latin typeface="Consolas" panose="020B0609020204030204" pitchFamily="49" charset="0"/>
-              </a:rPr>
-              <a:t>pkt</a:t>
-            </a:r>
-            <a:r>
-              <a:rPr lang="en-US" altLang="ko-KR" sz="900" dirty="0" smtClean="0">
-                <a:latin typeface="Consolas" panose="020B0609020204030204" pitchFamily="49" charset="0"/>
-              </a:rPr>
-              <a:t> header : </a:t>
-            </a:r>
-            <a:r>
-              <a:rPr lang="en-US" altLang="ko-KR" sz="900" dirty="0" err="1" smtClean="0">
-                <a:latin typeface="Consolas" panose="020B0609020204030204" pitchFamily="49" charset="0"/>
-              </a:rPr>
-              <a:t>msgtype</a:t>
-            </a:r>
-            <a:r>
-              <a:rPr lang="en-US" altLang="ko-KR" sz="900" dirty="0" smtClean="0">
-                <a:latin typeface="Consolas" panose="020B0609020204030204" pitchFamily="49" charset="0"/>
-              </a:rPr>
-              <a:t>=999</a:t>
-            </a:r>
-          </a:p>
-          <a:p>
-            <a:r>
-              <a:rPr lang="en-US" altLang="ko-KR" sz="900" dirty="0" err="1" smtClean="0">
-                <a:latin typeface="Consolas" panose="020B0609020204030204" pitchFamily="49" charset="0"/>
-              </a:rPr>
-              <a:t>pkt</a:t>
-            </a:r>
-            <a:r>
-              <a:rPr lang="en-US" altLang="ko-KR" sz="900" dirty="0" smtClean="0">
-                <a:latin typeface="Consolas" panose="020B0609020204030204" pitchFamily="49" charset="0"/>
-              </a:rPr>
-              <a:t> header : timestamp=-1514506509</a:t>
-            </a:r>
-          </a:p>
-          <a:p>
-            <a:r>
-              <a:rPr lang="en-US" altLang="ko-KR" sz="900" dirty="0" smtClean="0">
-                <a:latin typeface="Consolas" panose="020B0609020204030204" pitchFamily="49" charset="0"/>
-              </a:rPr>
-              <a:t>max packet length=1048576 received=93 </a:t>
-            </a:r>
-            <a:r>
-              <a:rPr lang="en-US" altLang="ko-KR" sz="900" dirty="0" err="1" smtClean="0">
-                <a:latin typeface="Consolas" panose="020B0609020204030204" pitchFamily="49" charset="0"/>
-              </a:rPr>
-              <a:t>packet_length</a:t>
-            </a:r>
-            <a:r>
-              <a:rPr lang="en-US" altLang="ko-KR" sz="900" dirty="0" smtClean="0">
-                <a:latin typeface="Consolas" panose="020B0609020204030204" pitchFamily="49" charset="0"/>
-              </a:rPr>
-              <a:t>=93 timestamp=3360389548 </a:t>
-            </a:r>
-            <a:r>
-              <a:rPr lang="en-US" altLang="ko-KR" sz="900" dirty="0" err="1" smtClean="0">
-                <a:latin typeface="Consolas" panose="020B0609020204030204" pitchFamily="49" charset="0"/>
-              </a:rPr>
-              <a:t>msgtype</a:t>
-            </a:r>
-            <a:r>
-              <a:rPr lang="en-US" altLang="ko-KR" sz="900" dirty="0" smtClean="0">
-                <a:latin typeface="Consolas" panose="020B0609020204030204" pitchFamily="49" charset="0"/>
-              </a:rPr>
-              <a:t>=1008</a:t>
-            </a:r>
-          </a:p>
-          <a:p>
-            <a:r>
-              <a:rPr lang="en-US" altLang="ko-KR" sz="900" dirty="0" smtClean="0">
-                <a:latin typeface="Consolas" panose="020B0609020204030204" pitchFamily="49" charset="0"/>
-              </a:rPr>
-              <a:t>accumulated packets=93   </a:t>
-            </a:r>
-            <a:r>
-              <a:rPr lang="en-US" altLang="ko-KR" sz="900" dirty="0" err="1" smtClean="0">
-                <a:latin typeface="Consolas" panose="020B0609020204030204" pitchFamily="49" charset="0"/>
-              </a:rPr>
-              <a:t>my_packet_size</a:t>
-            </a:r>
-            <a:r>
-              <a:rPr lang="en-US" altLang="ko-KR" sz="900" dirty="0" smtClean="0">
-                <a:latin typeface="Consolas" panose="020B0609020204030204" pitchFamily="49" charset="0"/>
-              </a:rPr>
-              <a:t>=-1</a:t>
-            </a:r>
-          </a:p>
-          <a:p>
-            <a:r>
-              <a:rPr lang="en-US" altLang="ko-KR" sz="900" dirty="0" smtClean="0">
-                <a:latin typeface="Consolas" panose="020B0609020204030204" pitchFamily="49" charset="0"/>
-              </a:rPr>
-              <a:t>accumulated packets=126   </a:t>
-            </a:r>
-            <a:r>
-              <a:rPr lang="en-US" altLang="ko-KR" sz="900" dirty="0" err="1" smtClean="0">
-                <a:latin typeface="Consolas" panose="020B0609020204030204" pitchFamily="49" charset="0"/>
-              </a:rPr>
-              <a:t>my_packet_size</a:t>
-            </a:r>
-            <a:r>
-              <a:rPr lang="en-US" altLang="ko-KR" sz="900" dirty="0" smtClean="0">
-                <a:latin typeface="Consolas" panose="020B0609020204030204" pitchFamily="49" charset="0"/>
-              </a:rPr>
-              <a:t>=-1</a:t>
-            </a:r>
-          </a:p>
-          <a:p>
-            <a:r>
-              <a:rPr lang="en-US" altLang="ko-KR" sz="900" dirty="0" err="1" smtClean="0">
-                <a:latin typeface="Consolas" panose="020B0609020204030204" pitchFamily="49" charset="0"/>
-              </a:rPr>
-              <a:t>CComm</a:t>
-            </a:r>
-            <a:r>
-              <a:rPr lang="en-US" altLang="ko-KR" sz="900" dirty="0" smtClean="0">
-                <a:latin typeface="Consolas" panose="020B0609020204030204" pitchFamily="49" charset="0"/>
-              </a:rPr>
-              <a:t>::disconnect()+ TLS=0</a:t>
-            </a:r>
-          </a:p>
-          <a:p>
-            <a:r>
-              <a:rPr lang="en-US" altLang="ko-KR" sz="900" dirty="0" err="1" smtClean="0">
-                <a:latin typeface="Consolas" panose="020B0609020204030204" pitchFamily="49" charset="0"/>
-              </a:rPr>
-              <a:t>CComm</a:t>
-            </a:r>
-            <a:r>
-              <a:rPr lang="en-US" altLang="ko-KR" sz="900" dirty="0" smtClean="0">
-                <a:latin typeface="Consolas" panose="020B0609020204030204" pitchFamily="49" charset="0"/>
-              </a:rPr>
-              <a:t>::disconnect()- TLS=0</a:t>
-            </a:r>
-          </a:p>
-          <a:p>
-            <a:r>
-              <a:rPr lang="en-US" altLang="ko-KR" sz="900" dirty="0" smtClean="0">
-                <a:latin typeface="Consolas" panose="020B0609020204030204" pitchFamily="49" charset="0"/>
-              </a:rPr>
-              <a:t>login not ok</a:t>
-            </a:r>
-          </a:p>
-          <a:p>
-            <a:r>
-              <a:rPr lang="en-US" altLang="ko-KR" sz="900" dirty="0" smtClean="0">
-                <a:latin typeface="Consolas" panose="020B0609020204030204" pitchFamily="49" charset="0"/>
-              </a:rPr>
-              <a:t>Server Setting MODE=0</a:t>
-            </a:r>
-          </a:p>
-          <a:p>
-            <a:r>
-              <a:rPr lang="en-US" altLang="ko-KR" sz="900" dirty="0" smtClean="0">
-                <a:latin typeface="Consolas" panose="020B0609020204030204" pitchFamily="49" charset="0"/>
-              </a:rPr>
-              <a:t> </a:t>
-            </a:r>
-            <a:r>
-              <a:rPr lang="en-US" altLang="ko-KR" sz="900" dirty="0" err="1" smtClean="0">
-                <a:latin typeface="Consolas" panose="020B0609020204030204" pitchFamily="49" charset="0"/>
-              </a:rPr>
-              <a:t>imgproc</a:t>
-            </a:r>
-            <a:r>
-              <a:rPr lang="en-US" altLang="ko-KR" sz="900" dirty="0" smtClean="0">
-                <a:latin typeface="Consolas" panose="020B0609020204030204" pitchFamily="49" charset="0"/>
-              </a:rPr>
-              <a:t> thread is sleeping....</a:t>
-            </a:r>
-          </a:p>
-          <a:p>
-            <a:r>
-              <a:rPr lang="en-US" altLang="ko-KR" sz="900" dirty="0" smtClean="0">
-                <a:latin typeface="Consolas" panose="020B0609020204030204" pitchFamily="49" charset="0"/>
-              </a:rPr>
-              <a:t>ACCOUNT= PASSWORD=</a:t>
-            </a:r>
-          </a:p>
-          <a:p>
-            <a:r>
-              <a:rPr lang="en-US" altLang="ko-KR" sz="900" dirty="0" smtClean="0">
-                <a:latin typeface="Consolas" panose="020B0609020204030204" pitchFamily="49" charset="0"/>
-              </a:rPr>
-              <a:t> Login fail.</a:t>
-            </a:r>
-          </a:p>
-          <a:p>
-            <a:r>
-              <a:rPr lang="en-US" altLang="ko-KR" sz="900" dirty="0" err="1" smtClean="0">
-                <a:latin typeface="Consolas" panose="020B0609020204030204" pitchFamily="49" charset="0"/>
-              </a:rPr>
-              <a:t>CBaseProtocol</a:t>
-            </a:r>
-            <a:r>
-              <a:rPr lang="en-US" altLang="ko-KR" sz="900" dirty="0" smtClean="0">
-                <a:latin typeface="Consolas" panose="020B0609020204030204" pitchFamily="49" charset="0"/>
-              </a:rPr>
-              <a:t>::</a:t>
-            </a:r>
-            <a:r>
-              <a:rPr lang="en-US" altLang="ko-KR" sz="900" dirty="0" err="1" smtClean="0">
-                <a:latin typeface="Consolas" panose="020B0609020204030204" pitchFamily="49" charset="0"/>
-              </a:rPr>
-              <a:t>CBaseProtocol</a:t>
-            </a:r>
-            <a:r>
-              <a:rPr lang="en-US" altLang="ko-KR" sz="900" dirty="0" smtClean="0">
-                <a:latin typeface="Consolas" panose="020B0609020204030204" pitchFamily="49" charset="0"/>
-              </a:rPr>
-              <a:t>() </a:t>
-            </a:r>
-            <a:r>
-              <a:rPr lang="en-US" altLang="ko-KR" sz="900" dirty="0" err="1" smtClean="0">
-                <a:latin typeface="Consolas" panose="020B0609020204030204" pitchFamily="49" charset="0"/>
-              </a:rPr>
-              <a:t>pmsg</a:t>
-            </a:r>
-            <a:r>
-              <a:rPr lang="en-US" altLang="ko-KR" sz="900" dirty="0" smtClean="0">
-                <a:latin typeface="Consolas" panose="020B0609020204030204" pitchFamily="49" charset="0"/>
-              </a:rPr>
-              <a:t>=0x0x7f63b59b08</a:t>
-            </a:r>
-          </a:p>
-          <a:p>
-            <a:r>
-              <a:rPr lang="en-US" altLang="ko-KR" sz="900" dirty="0" err="1" smtClean="0">
-                <a:latin typeface="Consolas" panose="020B0609020204030204" pitchFamily="49" charset="0"/>
-              </a:rPr>
-              <a:t>CBaseProtocol</a:t>
-            </a:r>
-            <a:r>
-              <a:rPr lang="en-US" altLang="ko-KR" sz="900" dirty="0" smtClean="0">
-                <a:latin typeface="Consolas" panose="020B0609020204030204" pitchFamily="49" charset="0"/>
-              </a:rPr>
-              <a:t>::</a:t>
-            </a:r>
-            <a:r>
-              <a:rPr lang="en-US" altLang="ko-KR" sz="900" dirty="0" err="1" smtClean="0">
-                <a:latin typeface="Consolas" panose="020B0609020204030204" pitchFamily="49" charset="0"/>
-              </a:rPr>
-              <a:t>getSize</a:t>
-            </a:r>
-            <a:r>
-              <a:rPr lang="en-US" altLang="ko-KR" sz="900" dirty="0" smtClean="0">
-                <a:latin typeface="Consolas" panose="020B0609020204030204" pitchFamily="49" charset="0"/>
-              </a:rPr>
-              <a:t>()=13</a:t>
-            </a:r>
-          </a:p>
-          <a:p>
-            <a:r>
-              <a:rPr lang="en-US" altLang="ko-KR" sz="900" dirty="0" smtClean="0">
-                <a:latin typeface="Consolas" panose="020B0609020204030204" pitchFamily="49" charset="0"/>
-              </a:rPr>
-              <a:t>Packetizing... packet type=9999</a:t>
-            </a:r>
-          </a:p>
-          <a:p>
-            <a:r>
-              <a:rPr lang="en-US" altLang="ko-KR" sz="900" dirty="0" smtClean="0">
-                <a:latin typeface="Consolas" panose="020B0609020204030204" pitchFamily="49" charset="0"/>
-              </a:rPr>
-              <a:t>Packetizing... packet size=29</a:t>
-            </a:r>
-          </a:p>
-          <a:p>
-            <a:r>
-              <a:rPr lang="en-US" altLang="ko-KR" sz="900" dirty="0" smtClean="0">
-                <a:latin typeface="Consolas" panose="020B0609020204030204" pitchFamily="49" charset="0"/>
-              </a:rPr>
-              <a:t>Packetizing... packet time=1462442552</a:t>
-            </a:r>
-          </a:p>
-          <a:p>
-            <a:r>
-              <a:rPr lang="en-US" altLang="ko-KR" sz="900" dirty="0" smtClean="0">
-                <a:latin typeface="Consolas" panose="020B0609020204030204" pitchFamily="49" charset="0"/>
-              </a:rPr>
-              <a:t>Segmentation fault</a:t>
-            </a:r>
-          </a:p>
-        </p:txBody>
-      </p:sp>
-      <p:sp>
-        <p:nvSpPr>
-          <p:cNvPr id="14" name="직사각형 13"/>
-          <p:cNvSpPr/>
-          <p:nvPr/>
-        </p:nvSpPr>
-        <p:spPr>
-          <a:xfrm>
-            <a:off x="6848459" y="914826"/>
-            <a:ext cx="4878101" cy="2723823"/>
+            <a:ext cx="5827741" cy="2723823"/>
           </a:xfrm>
           <a:prstGeom prst="rect">
             <a:avLst/>
@@ -7568,9 +7201,340 @@
           <a:lstStyle/>
           <a:p>
             <a:r>
+              <a:rPr lang="en-US" altLang="ko-KR" sz="900" dirty="0" err="1" smtClean="0">
+                <a:latin typeface="Consolas" panose="020B0609020204030204" pitchFamily="49" charset="0"/>
+              </a:rPr>
+              <a:t>pkt</a:t>
+            </a:r>
+            <a:r>
               <a:rPr lang="en-US" altLang="ko-KR" sz="900" dirty="0" smtClean="0">
                 <a:latin typeface="Consolas" panose="020B0609020204030204" pitchFamily="49" charset="0"/>
               </a:rPr>
+              <a:t> header : length=83  head=[SB1T]</a:t>
+            </a:r>
+          </a:p>
+          <a:p>
+            <a:r>
+              <a:rPr lang="en-US" altLang="ko-KR" sz="900" dirty="0" err="1" smtClean="0">
+                <a:latin typeface="Consolas" panose="020B0609020204030204" pitchFamily="49" charset="0"/>
+              </a:rPr>
+              <a:t>pkt</a:t>
+            </a:r>
+            <a:r>
+              <a:rPr lang="en-US" altLang="ko-KR" sz="900" dirty="0" smtClean="0">
+                <a:latin typeface="Consolas" panose="020B0609020204030204" pitchFamily="49" charset="0"/>
+              </a:rPr>
+              <a:t> header : </a:t>
+            </a:r>
+            <a:r>
+              <a:rPr lang="en-US" altLang="ko-KR" sz="900" dirty="0" err="1" smtClean="0">
+                <a:latin typeface="Consolas" panose="020B0609020204030204" pitchFamily="49" charset="0"/>
+              </a:rPr>
+              <a:t>msgtype</a:t>
+            </a:r>
+            <a:r>
+              <a:rPr lang="en-US" altLang="ko-KR" sz="900" dirty="0" smtClean="0">
+                <a:latin typeface="Consolas" panose="020B0609020204030204" pitchFamily="49" charset="0"/>
+              </a:rPr>
+              <a:t>=999</a:t>
+            </a:r>
+          </a:p>
+          <a:p>
+            <a:r>
+              <a:rPr lang="en-US" altLang="ko-KR" sz="900" dirty="0" err="1" smtClean="0">
+                <a:latin typeface="Consolas" panose="020B0609020204030204" pitchFamily="49" charset="0"/>
+              </a:rPr>
+              <a:t>pkt</a:t>
+            </a:r>
+            <a:r>
+              <a:rPr lang="en-US" altLang="ko-KR" sz="900" dirty="0" smtClean="0">
+                <a:latin typeface="Consolas" panose="020B0609020204030204" pitchFamily="49" charset="0"/>
+              </a:rPr>
+              <a:t> header : timestamp=-1514506509</a:t>
+            </a:r>
+          </a:p>
+          <a:p>
+            <a:r>
+              <a:rPr lang="en-US" altLang="ko-KR" sz="900" dirty="0" smtClean="0">
+                <a:latin typeface="Consolas" panose="020B0609020204030204" pitchFamily="49" charset="0"/>
+              </a:rPr>
+              <a:t>max packet length=1048576 received=93 </a:t>
+            </a:r>
+            <a:r>
+              <a:rPr lang="en-US" altLang="ko-KR" sz="900" dirty="0" err="1" smtClean="0">
+                <a:latin typeface="Consolas" panose="020B0609020204030204" pitchFamily="49" charset="0"/>
+              </a:rPr>
+              <a:t>packet_length</a:t>
+            </a:r>
+            <a:r>
+              <a:rPr lang="en-US" altLang="ko-KR" sz="900" dirty="0" smtClean="0">
+                <a:latin typeface="Consolas" panose="020B0609020204030204" pitchFamily="49" charset="0"/>
+              </a:rPr>
+              <a:t>=93 timestamp=3360389548 </a:t>
+            </a:r>
+            <a:r>
+              <a:rPr lang="en-US" altLang="ko-KR" sz="900" dirty="0" err="1" smtClean="0">
+                <a:latin typeface="Consolas" panose="020B0609020204030204" pitchFamily="49" charset="0"/>
+              </a:rPr>
+              <a:t>msgtype</a:t>
+            </a:r>
+            <a:r>
+              <a:rPr lang="en-US" altLang="ko-KR" sz="900" dirty="0" smtClean="0">
+                <a:latin typeface="Consolas" panose="020B0609020204030204" pitchFamily="49" charset="0"/>
+              </a:rPr>
+              <a:t>=1008</a:t>
+            </a:r>
+          </a:p>
+          <a:p>
+            <a:r>
+              <a:rPr lang="en-US" altLang="ko-KR" sz="900" dirty="0" smtClean="0">
+                <a:latin typeface="Consolas" panose="020B0609020204030204" pitchFamily="49" charset="0"/>
+              </a:rPr>
+              <a:t>accumulated packets=93   </a:t>
+            </a:r>
+            <a:r>
+              <a:rPr lang="en-US" altLang="ko-KR" sz="900" dirty="0" err="1" smtClean="0">
+                <a:latin typeface="Consolas" panose="020B0609020204030204" pitchFamily="49" charset="0"/>
+              </a:rPr>
+              <a:t>my_packet_size</a:t>
+            </a:r>
+            <a:r>
+              <a:rPr lang="en-US" altLang="ko-KR" sz="900" dirty="0" smtClean="0">
+                <a:latin typeface="Consolas" panose="020B0609020204030204" pitchFamily="49" charset="0"/>
+              </a:rPr>
+              <a:t>=-1</a:t>
+            </a:r>
+          </a:p>
+          <a:p>
+            <a:r>
+              <a:rPr lang="en-US" altLang="ko-KR" sz="900" dirty="0" smtClean="0">
+                <a:latin typeface="Consolas" panose="020B0609020204030204" pitchFamily="49" charset="0"/>
+              </a:rPr>
+              <a:t>accumulated packets=126   </a:t>
+            </a:r>
+            <a:r>
+              <a:rPr lang="en-US" altLang="ko-KR" sz="900" dirty="0" err="1" smtClean="0">
+                <a:latin typeface="Consolas" panose="020B0609020204030204" pitchFamily="49" charset="0"/>
+              </a:rPr>
+              <a:t>my_packet_size</a:t>
+            </a:r>
+            <a:r>
+              <a:rPr lang="en-US" altLang="ko-KR" sz="900" dirty="0" smtClean="0">
+                <a:latin typeface="Consolas" panose="020B0609020204030204" pitchFamily="49" charset="0"/>
+              </a:rPr>
+              <a:t>=-1</a:t>
+            </a:r>
+          </a:p>
+          <a:p>
+            <a:r>
+              <a:rPr lang="en-US" altLang="ko-KR" sz="900" dirty="0" err="1" smtClean="0">
+                <a:latin typeface="Consolas" panose="020B0609020204030204" pitchFamily="49" charset="0"/>
+              </a:rPr>
+              <a:t>CComm</a:t>
+            </a:r>
+            <a:r>
+              <a:rPr lang="en-US" altLang="ko-KR" sz="900" dirty="0" smtClean="0">
+                <a:latin typeface="Consolas" panose="020B0609020204030204" pitchFamily="49" charset="0"/>
+              </a:rPr>
+              <a:t>::disconnect()+ TLS=0</a:t>
+            </a:r>
+          </a:p>
+          <a:p>
+            <a:r>
+              <a:rPr lang="en-US" altLang="ko-KR" sz="900" dirty="0" err="1" smtClean="0">
+                <a:latin typeface="Consolas" panose="020B0609020204030204" pitchFamily="49" charset="0"/>
+              </a:rPr>
+              <a:t>CComm</a:t>
+            </a:r>
+            <a:r>
+              <a:rPr lang="en-US" altLang="ko-KR" sz="900" dirty="0" smtClean="0">
+                <a:latin typeface="Consolas" panose="020B0609020204030204" pitchFamily="49" charset="0"/>
+              </a:rPr>
+              <a:t>::disconnect()- TLS=0</a:t>
+            </a:r>
+          </a:p>
+          <a:p>
+            <a:r>
+              <a:rPr lang="en-US" altLang="ko-KR" sz="900" dirty="0" smtClean="0">
+                <a:latin typeface="Consolas" panose="020B0609020204030204" pitchFamily="49" charset="0"/>
+              </a:rPr>
+              <a:t>login not ok</a:t>
+            </a:r>
+          </a:p>
+          <a:p>
+            <a:r>
+              <a:rPr lang="en-US" altLang="ko-KR" sz="900" dirty="0" smtClean="0">
+                <a:latin typeface="Consolas" panose="020B0609020204030204" pitchFamily="49" charset="0"/>
+              </a:rPr>
+              <a:t>Server Setting MODE=0</a:t>
+            </a:r>
+          </a:p>
+          <a:p>
+            <a:r>
+              <a:rPr lang="en-US" altLang="ko-KR" sz="900" dirty="0" smtClean="0">
+                <a:latin typeface="Consolas" panose="020B0609020204030204" pitchFamily="49" charset="0"/>
+              </a:rPr>
+              <a:t> </a:t>
+            </a:r>
+            <a:r>
+              <a:rPr lang="en-US" altLang="ko-KR" sz="900" dirty="0" err="1" smtClean="0">
+                <a:latin typeface="Consolas" panose="020B0609020204030204" pitchFamily="49" charset="0"/>
+              </a:rPr>
+              <a:t>imgproc</a:t>
+            </a:r>
+            <a:r>
+              <a:rPr lang="en-US" altLang="ko-KR" sz="900" dirty="0" smtClean="0">
+                <a:latin typeface="Consolas" panose="020B0609020204030204" pitchFamily="49" charset="0"/>
+              </a:rPr>
+              <a:t> thread is sleeping....</a:t>
+            </a:r>
+          </a:p>
+          <a:p>
+            <a:r>
+              <a:rPr lang="en-US" altLang="ko-KR" sz="900" dirty="0" smtClean="0">
+                <a:latin typeface="Consolas" panose="020B0609020204030204" pitchFamily="49" charset="0"/>
+              </a:rPr>
+              <a:t>ACCOUNT= PASSWORD=</a:t>
+            </a:r>
+          </a:p>
+          <a:p>
+            <a:r>
+              <a:rPr lang="en-US" altLang="ko-KR" sz="900" dirty="0" smtClean="0">
+                <a:latin typeface="Consolas" panose="020B0609020204030204" pitchFamily="49" charset="0"/>
+              </a:rPr>
+              <a:t> Login fail.</a:t>
+            </a:r>
+          </a:p>
+          <a:p>
+            <a:r>
+              <a:rPr lang="en-US" altLang="ko-KR" sz="900" dirty="0" err="1" smtClean="0">
+                <a:latin typeface="Consolas" panose="020B0609020204030204" pitchFamily="49" charset="0"/>
+              </a:rPr>
+              <a:t>CBaseProtocol</a:t>
+            </a:r>
+            <a:r>
+              <a:rPr lang="en-US" altLang="ko-KR" sz="900" dirty="0" smtClean="0">
+                <a:latin typeface="Consolas" panose="020B0609020204030204" pitchFamily="49" charset="0"/>
+              </a:rPr>
+              <a:t>::</a:t>
+            </a:r>
+            <a:r>
+              <a:rPr lang="en-US" altLang="ko-KR" sz="900" dirty="0" err="1" smtClean="0">
+                <a:latin typeface="Consolas" panose="020B0609020204030204" pitchFamily="49" charset="0"/>
+              </a:rPr>
+              <a:t>CBaseProtocol</a:t>
+            </a:r>
+            <a:r>
+              <a:rPr lang="en-US" altLang="ko-KR" sz="900" dirty="0" smtClean="0">
+                <a:latin typeface="Consolas" panose="020B0609020204030204" pitchFamily="49" charset="0"/>
+              </a:rPr>
+              <a:t>() </a:t>
+            </a:r>
+            <a:r>
+              <a:rPr lang="en-US" altLang="ko-KR" sz="900" dirty="0" err="1" smtClean="0">
+                <a:latin typeface="Consolas" panose="020B0609020204030204" pitchFamily="49" charset="0"/>
+              </a:rPr>
+              <a:t>pmsg</a:t>
+            </a:r>
+            <a:r>
+              <a:rPr lang="en-US" altLang="ko-KR" sz="900" dirty="0" smtClean="0">
+                <a:latin typeface="Consolas" panose="020B0609020204030204" pitchFamily="49" charset="0"/>
+              </a:rPr>
+              <a:t>=0x0x7f63b59b08</a:t>
+            </a:r>
+          </a:p>
+          <a:p>
+            <a:r>
+              <a:rPr lang="en-US" altLang="ko-KR" sz="900" dirty="0" err="1" smtClean="0">
+                <a:latin typeface="Consolas" panose="020B0609020204030204" pitchFamily="49" charset="0"/>
+              </a:rPr>
+              <a:t>CBaseProtocol</a:t>
+            </a:r>
+            <a:r>
+              <a:rPr lang="en-US" altLang="ko-KR" sz="900" dirty="0" smtClean="0">
+                <a:latin typeface="Consolas" panose="020B0609020204030204" pitchFamily="49" charset="0"/>
+              </a:rPr>
+              <a:t>::</a:t>
+            </a:r>
+            <a:r>
+              <a:rPr lang="en-US" altLang="ko-KR" sz="900" dirty="0" err="1" smtClean="0">
+                <a:latin typeface="Consolas" panose="020B0609020204030204" pitchFamily="49" charset="0"/>
+              </a:rPr>
+              <a:t>getSize</a:t>
+            </a:r>
+            <a:r>
+              <a:rPr lang="en-US" altLang="ko-KR" sz="900" dirty="0" smtClean="0">
+                <a:latin typeface="Consolas" panose="020B0609020204030204" pitchFamily="49" charset="0"/>
+              </a:rPr>
+              <a:t>()=13</a:t>
+            </a:r>
+          </a:p>
+          <a:p>
+            <a:r>
+              <a:rPr lang="en-US" altLang="ko-KR" sz="900" dirty="0" smtClean="0">
+                <a:latin typeface="Consolas" panose="020B0609020204030204" pitchFamily="49" charset="0"/>
+              </a:rPr>
+              <a:t>Packetizing... packet type=9999</a:t>
+            </a:r>
+          </a:p>
+          <a:p>
+            <a:r>
+              <a:rPr lang="en-US" altLang="ko-KR" sz="900" dirty="0" smtClean="0">
+                <a:latin typeface="Consolas" panose="020B0609020204030204" pitchFamily="49" charset="0"/>
+              </a:rPr>
+              <a:t>Packetizing... packet size=29</a:t>
+            </a:r>
+          </a:p>
+          <a:p>
+            <a:r>
+              <a:rPr lang="en-US" altLang="ko-KR" sz="900" dirty="0" smtClean="0">
+                <a:latin typeface="Consolas" panose="020B0609020204030204" pitchFamily="49" charset="0"/>
+              </a:rPr>
+              <a:t>Packetizing... packet time=1462442552</a:t>
+            </a:r>
+          </a:p>
+          <a:p>
+            <a:r>
+              <a:rPr lang="en-US" altLang="ko-KR" sz="900" dirty="0" smtClean="0">
+                <a:latin typeface="Consolas" panose="020B0609020204030204" pitchFamily="49" charset="0"/>
+              </a:rPr>
+              <a:t>Segmentation fault</a:t>
+            </a:r>
+          </a:p>
+        </p:txBody>
+      </p:sp>
+      <p:sp>
+        <p:nvSpPr>
+          <p:cNvPr id="14" name="직사각형 13"/>
+          <p:cNvSpPr/>
+          <p:nvPr/>
+        </p:nvSpPr>
+        <p:spPr>
+          <a:xfrm>
+            <a:off x="6524609" y="914826"/>
+            <a:ext cx="4878101" cy="2308324"/>
+          </a:xfrm>
+          <a:prstGeom prst="rect">
+            <a:avLst/>
+          </a:prstGeom>
+          <a:ln>
+            <a:solidFill>
+              <a:schemeClr val="bg1">
+                <a:lumMod val="75000"/>
+              </a:schemeClr>
+            </a:solidFill>
+          </a:ln>
+        </p:spPr>
+        <p:txBody>
+          <a:bodyPr wrap="square">
+            <a:spAutoFit/>
+          </a:bodyPr>
+          <a:lstStyle/>
+          <a:p>
+            <a:r>
+              <a:rPr lang="en-US" altLang="ko-KR" sz="900" dirty="0" smtClean="0">
+                <a:latin typeface="Consolas" panose="020B0609020204030204" pitchFamily="49" charset="0"/>
+              </a:rPr>
               <a:t>$ python3 fuzz_tartan.py 16</a:t>
             </a:r>
           </a:p>
@@ -7580,53 +7544,6 @@
                 <a:latin typeface="Consolas" panose="020B0609020204030204" pitchFamily="49" charset="0"/>
               </a:rPr>
               <a:t>...</a:t>
-            </a:r>
-            <a:endParaRPr lang="en-US" altLang="ko-KR" sz="900" dirty="0">
-              <a:latin typeface="Consolas" panose="020B0609020204030204" pitchFamily="49" charset="0"/>
-            </a:endParaRPr>
-          </a:p>
-          <a:p>
-            <a:r>
-              <a:rPr lang="en-US" altLang="ko-KR" sz="900" dirty="0" smtClean="0">
-                <a:latin typeface="Consolas" panose="020B0609020204030204" pitchFamily="49" charset="0"/>
-              </a:rPr>
-              <a:t>[pkt_0000001104]</a:t>
-            </a:r>
-          </a:p>
-          <a:p>
-            <a:r>
-              <a:rPr lang="en-US" altLang="ko-KR" sz="900" dirty="0" smtClean="0">
-                <a:latin typeface="Consolas" panose="020B0609020204030204" pitchFamily="49" charset="0"/>
-              </a:rPr>
-              <a:t>0000  DB EC 6F 43 21 00 00 00 0F 18 EF DA EF 03 00 00  ..</a:t>
-            </a:r>
-            <a:r>
-              <a:rPr lang="en-US" altLang="ko-KR" sz="900" dirty="0" err="1" smtClean="0">
-                <a:latin typeface="Consolas" panose="020B0609020204030204" pitchFamily="49" charset="0"/>
-              </a:rPr>
-              <a:t>oC</a:t>
-            </a:r>
-            <a:r>
-              <a:rPr lang="en-US" altLang="ko-KR" sz="900" dirty="0" smtClean="0">
-                <a:latin typeface="Consolas" panose="020B0609020204030204" pitchFamily="49" charset="0"/>
-              </a:rPr>
-              <a:t>!...........</a:t>
-            </a:r>
-          </a:p>
-          <a:p>
-            <a:r>
-              <a:rPr lang="en-US" altLang="ko-KR" sz="900" dirty="0" smtClean="0">
-                <a:latin typeface="Consolas" panose="020B0609020204030204" pitchFamily="49" charset="0"/>
-              </a:rPr>
-              <a:t>0010  1A 14 DE 13 AA F2 16 41 BA 5E 7E 13 94 D2 D9 DA  .......A.^~.....</a:t>
-            </a:r>
-          </a:p>
-          <a:p>
-            <a:r>
-              <a:rPr lang="en-US" altLang="ko-KR" sz="900" dirty="0" smtClean="0">
-                <a:latin typeface="Consolas" panose="020B0609020204030204" pitchFamily="49" charset="0"/>
-              </a:rPr>
-              <a:t>0020  EE                                               .</a:t>
             </a:r>
           </a:p>
           <a:p>
@@ -7635,42 +7552,6 @@
             </a:endParaRPr>
           </a:p>
           <a:p>
-            <a:r>
-              <a:rPr lang="en-US" altLang="ko-KR" sz="900" dirty="0" smtClean="0">
-                <a:latin typeface="Consolas" panose="020B0609020204030204" pitchFamily="49" charset="0"/>
-              </a:rPr>
-              <a:t>[pkt_0000001105]</a:t>
-            </a:r>
-          </a:p>
-          <a:p>
-            <a:r>
-              <a:rPr lang="en-US" altLang="ko-KR" sz="900" dirty="0" smtClean="0">
-                <a:latin typeface="Consolas" panose="020B0609020204030204" pitchFamily="49" charset="0"/>
-              </a:rPr>
-              <a:t>0000  53 42 31 54 1D 00 00 00 EF F6 32 B7 EB 03 00 00  SB1T......2.....</a:t>
-            </a:r>
-          </a:p>
-          <a:p>
-            <a:r>
-              <a:rPr lang="en-US" altLang="ko-KR" sz="900" dirty="0" smtClean="0">
-                <a:latin typeface="Consolas" panose="020B0609020204030204" pitchFamily="49" charset="0"/>
-              </a:rPr>
-              <a:t>0010  C6 86 56 81 68 04 64 E4 BB 4D 6F 44 1A           ..V.h.d..</a:t>
-            </a:r>
-            <a:r>
-              <a:rPr lang="en-US" altLang="ko-KR" sz="900" dirty="0" err="1" smtClean="0">
-                <a:latin typeface="Consolas" panose="020B0609020204030204" pitchFamily="49" charset="0"/>
-              </a:rPr>
-              <a:t>MoD</a:t>
-            </a:r>
-            <a:r>
-              <a:rPr lang="en-US" altLang="ko-KR" sz="900" dirty="0" smtClean="0">
-                <a:latin typeface="Consolas" panose="020B0609020204030204" pitchFamily="49" charset="0"/>
-              </a:rPr>
-              <a:t>.</a:t>
-            </a:r>
-          </a:p>
-          <a:p>
             <a:endParaRPr lang="en-US" altLang="ko-KR" sz="900" dirty="0" smtClean="0">
               <a:latin typeface="Consolas" panose="020B0609020204030204" pitchFamily="49" charset="0"/>
             </a:endParaRPr>
@@ -7680,7 +7561,63 @@
               <a:rPr lang="en-US" altLang="ko-KR" sz="900" dirty="0" smtClean="0">
                 <a:latin typeface="Consolas" panose="020B0609020204030204" pitchFamily="49" charset="0"/>
               </a:rPr>
-              <a:t>[pkt_0000001106]</a:t>
+              <a:t>[pkt_0000001105]</a:t>
+            </a:r>
+          </a:p>
+          <a:p>
+            <a:r>
+              <a:rPr lang="en-US" altLang="ko-KR" sz="900" dirty="0" smtClean="0">
+                <a:latin typeface="Consolas" panose="020B0609020204030204" pitchFamily="49" charset="0"/>
+              </a:rPr>
+              <a:t>0000  53 42 31 54 1D 00 00 00 EF F6 32 B7 EB 03 00 00  SB1T......2.....</a:t>
+            </a:r>
+          </a:p>
+          <a:p>
+            <a:r>
+              <a:rPr lang="en-US" altLang="ko-KR" sz="900" dirty="0" smtClean="0">
+                <a:latin typeface="Consolas" panose="020B0609020204030204" pitchFamily="49" charset="0"/>
+              </a:rPr>
+              <a:t>0010  C6 86 56 81 68 04 64 E4 BB 4D 6F 44 1A           ..V.h.d..</a:t>
+            </a:r>
+            <a:r>
+              <a:rPr lang="en-US" altLang="ko-KR" sz="900" dirty="0" err="1" smtClean="0">
+                <a:latin typeface="Consolas" panose="020B0609020204030204" pitchFamily="49" charset="0"/>
+              </a:rPr>
+              <a:t>MoD</a:t>
+            </a:r>
+            <a:r>
+              <a:rPr lang="en-US" altLang="ko-KR" sz="900" dirty="0" smtClean="0">
+                <a:latin typeface="Consolas" panose="020B0609020204030204" pitchFamily="49" charset="0"/>
+              </a:rPr>
+              <a:t>.</a:t>
+            </a:r>
+          </a:p>
+          <a:p>
+            <a:endParaRPr lang="en-US" altLang="ko-KR" sz="900" dirty="0" smtClean="0">
+              <a:latin typeface="Consolas" panose="020B0609020204030204" pitchFamily="49" charset="0"/>
+            </a:endParaRPr>
+          </a:p>
+          <a:p>
+            <a:r>
+              <a:rPr lang="en-US" altLang="ko-KR" sz="900" dirty="0" smtClean="0">
+                <a:latin typeface="Consolas" panose="020B0609020204030204" pitchFamily="49" charset="0"/>
+              </a:rPr>
+              <a:t>[</a:t>
+            </a:r>
+            <a:r>
+              <a:rPr lang="en-US" altLang="ko-KR" sz="900" b="1" u="sng" dirty="0" smtClean="0">
+                <a:solidFill>
+                  <a:srgbClr val="FF0000"/>
+                </a:solidFill>
+                <a:latin typeface="Consolas" panose="020B0609020204030204" pitchFamily="49" charset="0"/>
+              </a:rPr>
+              <a:t>pkt_0000001106</a:t>
+            </a:r>
+            <a:r>
+              <a:rPr lang="en-US" altLang="ko-KR" sz="900" dirty="0" smtClean="0">
+                <a:latin typeface="Consolas" panose="020B0609020204030204" pitchFamily="49" charset="0"/>
+              </a:rPr>
+              <a:t>]</a:t>
             </a:r>
           </a:p>
           <a:p>
@@ -7815,8 +7752,8 @@
         </p:nvSpPr>
         <p:spPr>
           <a:xfrm>
-            <a:off x="3279698" y="3743340"/>
-            <a:ext cx="605550" cy="276999"/>
+            <a:off x="5645971" y="4016985"/>
+            <a:ext cx="635239" cy="276999"/>
           </a:xfrm>
           <a:prstGeom prst="rect">
             <a:avLst/>
@@ -7831,10 +7768,22 @@
           <a:p>
             <a:pPr algn="ctr"/>
             <a:r>
-              <a:rPr lang="en-US" altLang="ko-KR" sz="1200" dirty="0" smtClean="0"/>
+              <a:rPr lang="en-US" altLang="ko-KR" sz="1200" b="1" i="1" u="sng" dirty="0" smtClean="0">
+                <a:solidFill>
+                  <a:schemeClr val="accent1">
+                    <a:lumMod val="50000"/>
+                  </a:schemeClr>
+                </a:solidFill>
+              </a:rPr>
               <a:t>server</a:t>
             </a:r>
-            <a:endParaRPr lang="ko-KR" altLang="en-US" sz="1200" dirty="0"/>
+            <a:endParaRPr lang="ko-KR" altLang="en-US" sz="1200" b="1" i="1" u="sng" dirty="0">
+              <a:solidFill>
+                <a:schemeClr val="accent1">
+                  <a:lumMod val="50000"/>
+                </a:schemeClr>
+              </a:solidFill>
+            </a:endParaRPr>
           </a:p>
         </p:txBody>
       </p:sp>
@@ -7846,8 +7795,8 @@
         </p:nvSpPr>
         <p:spPr>
           <a:xfrm>
-            <a:off x="7890297" y="3743339"/>
-            <a:ext cx="2501326" cy="276999"/>
+            <a:off x="9622607" y="4013817"/>
+            <a:ext cx="1780103" cy="461665"/>
           </a:xfrm>
           <a:prstGeom prst="rect">
             <a:avLst/>
@@ -7860,12 +7809,47 @@
           </a:bodyPr>
           <a:lstStyle/>
           <a:p>
-            <a:pPr algn="ctr"/>
-            <a:r>
-              <a:rPr lang="en-US" altLang="ko-KR" sz="1200" dirty="0" smtClean="0"/>
-              <a:t>attacker - python3 fuzz_tartan.py</a:t>
-            </a:r>
-            <a:endParaRPr lang="ko-KR" altLang="en-US" sz="1200" dirty="0"/>
+            <a:pPr algn="r"/>
+            <a:r>
+              <a:rPr lang="en-US" altLang="ko-KR" sz="1200" b="1" i="1" u="sng" dirty="0" smtClean="0">
+                <a:solidFill>
+                  <a:schemeClr val="accent1">
+                    <a:lumMod val="50000"/>
+                  </a:schemeClr>
+                </a:solidFill>
+              </a:rPr>
+              <a:t>attacker</a:t>
+            </a:r>
+          </a:p>
+          <a:p>
+            <a:pPr algn="r"/>
+            <a:r>
+              <a:rPr lang="en-US" altLang="ko-KR" sz="1200" dirty="0" smtClean="0">
+                <a:solidFill>
+                  <a:schemeClr val="accent1">
+                    <a:lumMod val="50000"/>
+                  </a:schemeClr>
+                </a:solidFill>
+              </a:rPr>
+              <a:t>python3 </a:t>
+            </a:r>
+            <a:r>
+              <a:rPr lang="en-US" altLang="ko-KR" sz="1200" dirty="0" smtClean="0">
+                <a:solidFill>
+                  <a:schemeClr val="accent1">
+                    <a:lumMod val="50000"/>
+                  </a:schemeClr>
+                </a:solidFill>
+              </a:rPr>
+              <a:t>fuzz_tartan.py</a:t>
+            </a:r>
+            <a:endParaRPr lang="ko-KR" altLang="en-US" sz="1200" dirty="0">
+              <a:solidFill>
+                <a:schemeClr val="accent1">
+                  <a:lumMod val="50000"/>
+                </a:schemeClr>
+              </a:solidFill>
+            </a:endParaRPr>
           </a:p>
         </p:txBody>
       </p:sp>
@@ -7878,372 +7862,7 @@
         <p:spPr>
           <a:xfrm>
             <a:off x="458759" y="4013817"/>
-            <a:ext cx="6096000" cy="2723823"/>
-          </a:xfrm>
-          <a:prstGeom prst="rect">
-            <a:avLst/>
-          </a:prstGeom>
-          <a:ln>
-            <a:solidFill>
-              <a:schemeClr val="bg1">
-                <a:lumMod val="75000"/>
-              </a:schemeClr>
-            </a:solidFill>
-          </a:ln>
-        </p:spPr>
-        <p:txBody>
-          <a:bodyPr>
-            <a:spAutoFit/>
-          </a:bodyPr>
-          <a:lstStyle/>
-          <a:p>
-            <a:r>
-              <a:rPr lang="en-US" altLang="ko-KR" sz="900" dirty="0" smtClean="0">
-                <a:latin typeface="Consolas" panose="020B0609020204030204" pitchFamily="49" charset="0"/>
-              </a:rPr>
-              <a:t>Accepted connection Request</a:t>
-            </a:r>
-          </a:p>
-          <a:p>
-            <a:r>
-              <a:rPr lang="en-US" altLang="ko-KR" sz="900" dirty="0" smtClean="0">
-                <a:latin typeface="Consolas" panose="020B0609020204030204" pitchFamily="49" charset="0"/>
-              </a:rPr>
-              <a:t>Connection </a:t>
-            </a:r>
-            <a:r>
-              <a:rPr lang="en-US" altLang="ko-KR" sz="900" dirty="0" err="1" smtClean="0">
-                <a:latin typeface="Consolas" panose="020B0609020204030204" pitchFamily="49" charset="0"/>
-              </a:rPr>
-              <a:t>Msg</a:t>
-            </a:r>
-            <a:r>
-              <a:rPr lang="en-US" altLang="ko-KR" sz="900" dirty="0" smtClean="0">
-                <a:latin typeface="Consolas" panose="020B0609020204030204" pitchFamily="49" charset="0"/>
-              </a:rPr>
-              <a:t> </a:t>
-            </a:r>
-            <a:r>
-              <a:rPr lang="en-US" altLang="ko-KR" sz="900" dirty="0" err="1" smtClean="0">
-                <a:latin typeface="Consolas" panose="020B0609020204030204" pitchFamily="49" charset="0"/>
-              </a:rPr>
-              <a:t>sent..TLS</a:t>
-            </a:r>
-            <a:r>
-              <a:rPr lang="en-US" altLang="ko-KR" sz="900" dirty="0" smtClean="0">
-                <a:latin typeface="Consolas" panose="020B0609020204030204" pitchFamily="49" charset="0"/>
-              </a:rPr>
-              <a:t>=0</a:t>
-            </a:r>
-          </a:p>
-          <a:p>
-            <a:r>
-              <a:rPr lang="en-US" altLang="ko-KR" sz="900" dirty="0" smtClean="0">
-                <a:latin typeface="Consolas" panose="020B0609020204030204" pitchFamily="49" charset="0"/>
-              </a:rPr>
-              <a:t>Connected.........................TLS=0</a:t>
-            </a:r>
-          </a:p>
-          <a:p>
-            <a:r>
-              <a:rPr lang="en-US" altLang="ko-KR" sz="900" dirty="0" smtClean="0">
-                <a:latin typeface="Consolas" panose="020B0609020204030204" pitchFamily="49" charset="0"/>
-              </a:rPr>
-              <a:t>MYMSG_NET_CONNECTED</a:t>
-            </a:r>
-          </a:p>
-          <a:p>
-            <a:r>
-              <a:rPr lang="en-US" altLang="ko-KR" sz="900" dirty="0" smtClean="0">
-                <a:latin typeface="Consolas" panose="020B0609020204030204" pitchFamily="49" charset="0"/>
-              </a:rPr>
-              <a:t>wait for login....</a:t>
-            </a:r>
-          </a:p>
-          <a:p>
-            <a:r>
-              <a:rPr lang="en-US" altLang="ko-KR" sz="900" dirty="0" smtClean="0">
-                <a:latin typeface="Consolas" panose="020B0609020204030204" pitchFamily="49" charset="0"/>
-              </a:rPr>
-              <a:t>max packet length=1048576 received=1033 </a:t>
-            </a:r>
-            <a:r>
-              <a:rPr lang="en-US" altLang="ko-KR" sz="900" dirty="0" err="1" smtClean="0">
-                <a:latin typeface="Consolas" panose="020B0609020204030204" pitchFamily="49" charset="0"/>
-              </a:rPr>
-              <a:t>packet_length</a:t>
-            </a:r>
-            <a:r>
-              <a:rPr lang="en-US" altLang="ko-KR" sz="900" dirty="0" smtClean="0">
-                <a:latin typeface="Consolas" panose="020B0609020204030204" pitchFamily="49" charset="0"/>
-              </a:rPr>
-              <a:t>=6 timestamp=239280418 </a:t>
-            </a:r>
-            <a:r>
-              <a:rPr lang="en-US" altLang="ko-KR" sz="900" dirty="0" err="1" smtClean="0">
-                <a:latin typeface="Consolas" panose="020B0609020204030204" pitchFamily="49" charset="0"/>
-              </a:rPr>
-              <a:t>msgtype</a:t>
-            </a:r>
-            <a:r>
-              <a:rPr lang="en-US" altLang="ko-KR" sz="900" dirty="0" smtClean="0">
-                <a:latin typeface="Consolas" panose="020B0609020204030204" pitchFamily="49" charset="0"/>
-              </a:rPr>
-              <a:t>=1005</a:t>
-            </a:r>
-          </a:p>
-          <a:p>
-            <a:r>
-              <a:rPr lang="en-US" altLang="ko-KR" sz="900" dirty="0" smtClean="0">
-                <a:latin typeface="Consolas" panose="020B0609020204030204" pitchFamily="49" charset="0"/>
-              </a:rPr>
-              <a:t>accumulated packets=1033   </a:t>
-            </a:r>
-            <a:r>
-              <a:rPr lang="en-US" altLang="ko-KR" sz="900" dirty="0" err="1" smtClean="0">
-                <a:latin typeface="Consolas" panose="020B0609020204030204" pitchFamily="49" charset="0"/>
-              </a:rPr>
-              <a:t>my_packet_size</a:t>
-            </a:r>
-            <a:r>
-              <a:rPr lang="en-US" altLang="ko-KR" sz="900" dirty="0" smtClean="0">
-                <a:latin typeface="Consolas" panose="020B0609020204030204" pitchFamily="49" charset="0"/>
-              </a:rPr>
-              <a:t>=6</a:t>
-            </a:r>
-          </a:p>
-          <a:p>
-            <a:r>
-              <a:rPr lang="en-US" altLang="ko-KR" sz="900" dirty="0" smtClean="0">
-                <a:latin typeface="Consolas" panose="020B0609020204030204" pitchFamily="49" charset="0"/>
-              </a:rPr>
-              <a:t>bytes=1033, data=[SB1T]</a:t>
-            </a:r>
-          </a:p>
-          <a:p>
-            <a:r>
-              <a:rPr lang="en-US" altLang="ko-KR" sz="900" dirty="0" err="1" smtClean="0">
-                <a:latin typeface="Consolas" panose="020B0609020204030204" pitchFamily="49" charset="0"/>
-              </a:rPr>
-              <a:t>pkt</a:t>
-            </a:r>
-            <a:r>
-              <a:rPr lang="en-US" altLang="ko-KR" sz="900" dirty="0" smtClean="0">
-                <a:latin typeface="Consolas" panose="020B0609020204030204" pitchFamily="49" charset="0"/>
-              </a:rPr>
-              <a:t> header : length=6  head=[SB1T]</a:t>
-            </a:r>
-          </a:p>
-          <a:p>
-            <a:r>
-              <a:rPr lang="en-US" altLang="ko-KR" sz="900" dirty="0" err="1" smtClean="0">
-                <a:latin typeface="Consolas" panose="020B0609020204030204" pitchFamily="49" charset="0"/>
-              </a:rPr>
-              <a:t>pkt</a:t>
-            </a:r>
-            <a:r>
-              <a:rPr lang="en-US" altLang="ko-KR" sz="900" dirty="0" smtClean="0">
-                <a:latin typeface="Consolas" panose="020B0609020204030204" pitchFamily="49" charset="0"/>
-              </a:rPr>
-              <a:t> header : </a:t>
-            </a:r>
-            <a:r>
-              <a:rPr lang="en-US" altLang="ko-KR" sz="900" dirty="0" err="1" smtClean="0">
-                <a:latin typeface="Consolas" panose="020B0609020204030204" pitchFamily="49" charset="0"/>
-              </a:rPr>
-              <a:t>msgtype</a:t>
-            </a:r>
-            <a:r>
-              <a:rPr lang="en-US" altLang="ko-KR" sz="900" dirty="0" smtClean="0">
-                <a:latin typeface="Consolas" panose="020B0609020204030204" pitchFamily="49" charset="0"/>
-              </a:rPr>
-              <a:t>=1005</a:t>
-            </a:r>
-          </a:p>
-          <a:p>
-            <a:r>
-              <a:rPr lang="en-US" altLang="ko-KR" sz="900" dirty="0" err="1" smtClean="0">
-                <a:latin typeface="Consolas" panose="020B0609020204030204" pitchFamily="49" charset="0"/>
-              </a:rPr>
-              <a:t>pkt</a:t>
-            </a:r>
-            <a:r>
-              <a:rPr lang="en-US" altLang="ko-KR" sz="900" dirty="0" smtClean="0">
-                <a:latin typeface="Consolas" panose="020B0609020204030204" pitchFamily="49" charset="0"/>
-              </a:rPr>
-              <a:t> header : timestamp=239280418</a:t>
-            </a:r>
-          </a:p>
-          <a:p>
-            <a:r>
-              <a:rPr lang="en-US" altLang="ko-KR" sz="900" dirty="0" err="1" smtClean="0">
-                <a:latin typeface="Consolas" panose="020B0609020204030204" pitchFamily="49" charset="0"/>
-              </a:rPr>
-              <a:t>CBaseProtocol</a:t>
-            </a:r>
-            <a:r>
-              <a:rPr lang="en-US" altLang="ko-KR" sz="900" dirty="0" smtClean="0">
-                <a:latin typeface="Consolas" panose="020B0609020204030204" pitchFamily="49" charset="0"/>
-              </a:rPr>
-              <a:t>::</a:t>
-            </a:r>
-            <a:r>
-              <a:rPr lang="en-US" altLang="ko-KR" sz="900" dirty="0" err="1" smtClean="0">
-                <a:latin typeface="Consolas" panose="020B0609020204030204" pitchFamily="49" charset="0"/>
-              </a:rPr>
-              <a:t>CBaseProtocol</a:t>
-            </a:r>
-            <a:r>
-              <a:rPr lang="en-US" altLang="ko-KR" sz="900" dirty="0" smtClean="0">
-                <a:latin typeface="Consolas" panose="020B0609020204030204" pitchFamily="49" charset="0"/>
-              </a:rPr>
-              <a:t>() </a:t>
-            </a:r>
-            <a:r>
-              <a:rPr lang="en-US" altLang="ko-KR" sz="900" dirty="0" err="1" smtClean="0">
-                <a:latin typeface="Consolas" panose="020B0609020204030204" pitchFamily="49" charset="0"/>
-              </a:rPr>
-              <a:t>pmsg</a:t>
-            </a:r>
-            <a:r>
-              <a:rPr lang="en-US" altLang="ko-KR" sz="900" dirty="0" smtClean="0">
-                <a:latin typeface="Consolas" panose="020B0609020204030204" pitchFamily="49" charset="0"/>
-              </a:rPr>
-              <a:t>=0x0x7f5c1024d8</a:t>
-            </a:r>
-          </a:p>
-          <a:p>
-            <a:r>
-              <a:rPr lang="en-US" altLang="ko-KR" sz="900" dirty="0" err="1" smtClean="0">
-                <a:latin typeface="Consolas" panose="020B0609020204030204" pitchFamily="49" charset="0"/>
-              </a:rPr>
-              <a:t>CBaseProtocol</a:t>
-            </a:r>
-            <a:r>
-              <a:rPr lang="en-US" altLang="ko-KR" sz="900" dirty="0" smtClean="0">
-                <a:latin typeface="Consolas" panose="020B0609020204030204" pitchFamily="49" charset="0"/>
-              </a:rPr>
-              <a:t>::</a:t>
-            </a:r>
-            <a:r>
-              <a:rPr lang="en-US" altLang="ko-KR" sz="900" dirty="0" err="1" smtClean="0">
-                <a:latin typeface="Consolas" panose="020B0609020204030204" pitchFamily="49" charset="0"/>
-              </a:rPr>
-              <a:t>deSerialize</a:t>
-            </a:r>
-            <a:r>
-              <a:rPr lang="en-US" altLang="ko-KR" sz="900" dirty="0" smtClean="0">
-                <a:latin typeface="Consolas" panose="020B0609020204030204" pitchFamily="49" charset="0"/>
-              </a:rPr>
-              <a:t>()+</a:t>
-            </a:r>
-          </a:p>
-          <a:p>
-            <a:r>
-              <a:rPr lang="en-US" altLang="ko-KR" sz="900" dirty="0" smtClean="0">
-                <a:latin typeface="Consolas" panose="020B0609020204030204" pitchFamily="49" charset="0"/>
-              </a:rPr>
-              <a:t>[</a:t>
-            </a:r>
-            <a:r>
-              <a:rPr lang="en-US" altLang="ko-KR" sz="900" dirty="0" err="1" smtClean="0">
-                <a:latin typeface="Consolas" panose="020B0609020204030204" pitchFamily="49" charset="0"/>
-              </a:rPr>
-              <a:t>libprotobuf</a:t>
-            </a:r>
-            <a:r>
-              <a:rPr lang="en-US" altLang="ko-KR" sz="900" dirty="0" smtClean="0">
-                <a:latin typeface="Consolas" panose="020B0609020204030204" pitchFamily="49" charset="0"/>
-              </a:rPr>
-              <a:t> FATAL google/</a:t>
-            </a:r>
-            <a:r>
-              <a:rPr lang="en-US" altLang="ko-KR" sz="900" dirty="0" err="1" smtClean="0">
-                <a:latin typeface="Consolas" panose="020B0609020204030204" pitchFamily="49" charset="0"/>
-              </a:rPr>
-              <a:t>protobuf</a:t>
-            </a:r>
-            <a:r>
-              <a:rPr lang="en-US" altLang="ko-KR" sz="900" dirty="0" smtClean="0">
-                <a:latin typeface="Consolas" panose="020B0609020204030204" pitchFamily="49" charset="0"/>
-              </a:rPr>
-              <a:t>/stubs/stringpiece.cc:50] size too big: 18446744073709551606 details: string length exceeds max size</a:t>
-            </a:r>
-          </a:p>
-          <a:p>
-            <a:r>
-              <a:rPr lang="en-US" altLang="ko-KR" sz="900" dirty="0" smtClean="0">
-                <a:latin typeface="Consolas" panose="020B0609020204030204" pitchFamily="49" charset="0"/>
-              </a:rPr>
-              <a:t>terminate called after throwing an instance of 'google::</a:t>
-            </a:r>
-            <a:r>
-              <a:rPr lang="en-US" altLang="ko-KR" sz="900" dirty="0" err="1" smtClean="0">
-                <a:latin typeface="Consolas" panose="020B0609020204030204" pitchFamily="49" charset="0"/>
-              </a:rPr>
-              <a:t>protobuf</a:t>
-            </a:r>
-            <a:r>
-              <a:rPr lang="en-US" altLang="ko-KR" sz="900" dirty="0" smtClean="0">
-                <a:latin typeface="Consolas" panose="020B0609020204030204" pitchFamily="49" charset="0"/>
-              </a:rPr>
-              <a:t>::</a:t>
-            </a:r>
-            <a:r>
-              <a:rPr lang="en-US" altLang="ko-KR" sz="900" dirty="0" err="1" smtClean="0">
-                <a:latin typeface="Consolas" panose="020B0609020204030204" pitchFamily="49" charset="0"/>
-              </a:rPr>
-              <a:t>FatalException</a:t>
-            </a:r>
-            <a:r>
-              <a:rPr lang="en-US" altLang="ko-KR" sz="900" dirty="0" smtClean="0">
-                <a:latin typeface="Consolas" panose="020B0609020204030204" pitchFamily="49" charset="0"/>
-              </a:rPr>
-              <a:t>'</a:t>
-            </a:r>
-          </a:p>
-          <a:p>
-            <a:r>
-              <a:rPr lang="en-US" altLang="ko-KR" sz="900" dirty="0" smtClean="0">
-                <a:latin typeface="Consolas" panose="020B0609020204030204" pitchFamily="49" charset="0"/>
-              </a:rPr>
-              <a:t>  what():  size too big: 18446744073709551606 details: string length exceeds max size</a:t>
-            </a:r>
-          </a:p>
-          <a:p>
-            <a:r>
-              <a:rPr lang="en-US" altLang="ko-KR" sz="900" dirty="0" smtClean="0">
-                <a:latin typeface="Consolas" panose="020B0609020204030204" pitchFamily="49" charset="0"/>
-              </a:rPr>
-              <a:t>Aborted</a:t>
-            </a:r>
-          </a:p>
-          <a:p>
-            <a:r>
-              <a:rPr lang="en-US" altLang="ko-KR" sz="900" dirty="0" err="1" smtClean="0">
-                <a:latin typeface="Consolas" panose="020B0609020204030204" pitchFamily="49" charset="0"/>
-              </a:rPr>
-              <a:t>lg@LgFaceRecProject</a:t>
-            </a:r>
-            <a:r>
-              <a:rPr lang="en-US" altLang="ko-KR" sz="900" dirty="0" smtClean="0">
-                <a:latin typeface="Consolas" panose="020B0609020204030204" pitchFamily="49" charset="0"/>
-              </a:rPr>
-              <a:t>:~/team6/tartan/LgFaceRecDemoTCP_Jetson_NanoV2/build$</a:t>
-            </a:r>
-          </a:p>
-        </p:txBody>
-      </p:sp>
-      <p:sp>
-        <p:nvSpPr>
-          <p:cNvPr id="25" name="직사각형 24"/>
-          <p:cNvSpPr/>
-          <p:nvPr/>
-        </p:nvSpPr>
-        <p:spPr>
-          <a:xfrm>
-            <a:off x="6848459" y="4013818"/>
-            <a:ext cx="4878101" cy="2308324"/>
+            <a:ext cx="5827741" cy="2585323"/>
           </a:xfrm>
           <a:prstGeom prst="rect">
             <a:avLst/>
@@ -8266,7 +7885,7 @@
               <a:rPr lang="en-US" altLang="ko-KR" sz="900" dirty="0" smtClean="0">
                 <a:latin typeface="Consolas" panose="020B0609020204030204" pitchFamily="49" charset="0"/>
               </a:rPr>
-              <a:t>$ python3 fuzz_tartan.py</a:t>
+              <a:t>Accepted connection Request</a:t>
             </a:r>
           </a:p>
           <a:p>
@@ -8274,23 +7893,31 @@
               <a:rPr lang="en-US" altLang="ko-KR" sz="900" dirty="0" smtClean="0">
                 <a:latin typeface="Consolas" panose="020B0609020204030204" pitchFamily="49" charset="0"/>
               </a:rPr>
-              <a:t>...</a:t>
-            </a:r>
-          </a:p>
-          <a:p>
+              <a:t>Connection </a:t>
+            </a:r>
+            <a:r>
+              <a:rPr lang="en-US" altLang="ko-KR" sz="900" dirty="0" err="1" smtClean="0">
+                <a:latin typeface="Consolas" panose="020B0609020204030204" pitchFamily="49" charset="0"/>
+              </a:rPr>
+              <a:t>Msg</a:t>
+            </a:r>
             <a:r>
               <a:rPr lang="en-US" altLang="ko-KR" sz="900" dirty="0" smtClean="0">
                 <a:latin typeface="Consolas" panose="020B0609020204030204" pitchFamily="49" charset="0"/>
               </a:rPr>
-              <a:t>[pkt_0000000020]</a:t>
-            </a:r>
-          </a:p>
-          <a:p>
+              <a:t> </a:t>
+            </a:r>
+            <a:r>
+              <a:rPr lang="en-US" altLang="ko-KR" sz="900" dirty="0" err="1" smtClean="0">
+                <a:latin typeface="Consolas" panose="020B0609020204030204" pitchFamily="49" charset="0"/>
+              </a:rPr>
+              <a:t>sent..TLS</a:t>
+            </a:r>
             <a:r>
               <a:rPr lang="en-US" altLang="ko-KR" sz="900" dirty="0" smtClean="0">
                 <a:latin typeface="Consolas" panose="020B0609020204030204" pitchFamily="49" charset="0"/>
               </a:rPr>
-              <a:t>0000  53 42 31 54 19 00 00 00 B1 8C 20 62 E9 03 00 00  SB1T...... b....</a:t>
+              <a:t>=0</a:t>
             </a:r>
           </a:p>
           <a:p>
@@ -8298,7 +7925,7 @@
               <a:rPr lang="en-US" altLang="ko-KR" sz="900" dirty="0" smtClean="0">
                 <a:latin typeface="Consolas" panose="020B0609020204030204" pitchFamily="49" charset="0"/>
               </a:rPr>
-              <a:t>0010  9F 20 06 42 09 DF D9 B9 0C 5B 14 46 34 73 7E 2D  . .B.....[.F4s~-</a:t>
+              <a:t>Connected.........................TLS=0</a:t>
             </a:r>
           </a:p>
           <a:p>
@@ -8306,44 +7933,415 @@
               <a:rPr lang="en-US" altLang="ko-KR" sz="900" dirty="0" smtClean="0">
                 <a:latin typeface="Consolas" panose="020B0609020204030204" pitchFamily="49" charset="0"/>
               </a:rPr>
-              <a:t>0020  4C 6A FB 9C A4 6E 48 7B C5                       </a:t>
+              <a:t>MYMSG_NET_CONNECTED</a:t>
+            </a:r>
+          </a:p>
+          <a:p>
+            <a:r>
+              <a:rPr lang="en-US" altLang="ko-KR" sz="900" dirty="0" smtClean="0">
+                <a:latin typeface="Consolas" panose="020B0609020204030204" pitchFamily="49" charset="0"/>
+              </a:rPr>
+              <a:t>wait for login....</a:t>
+            </a:r>
+          </a:p>
+          <a:p>
+            <a:r>
+              <a:rPr lang="en-US" altLang="ko-KR" sz="900" dirty="0" smtClean="0">
+                <a:latin typeface="Consolas" panose="020B0609020204030204" pitchFamily="49" charset="0"/>
+              </a:rPr>
+              <a:t>max packet length=1048576 received=1033 </a:t>
             </a:r>
             <a:r>
               <a:rPr lang="en-US" altLang="ko-KR" sz="900" dirty="0" err="1" smtClean="0">
                 <a:latin typeface="Consolas" panose="020B0609020204030204" pitchFamily="49" charset="0"/>
               </a:rPr>
-              <a:t>Lj</a:t>
+              <a:t>packet_length</a:t>
             </a:r>
             <a:r>
               <a:rPr lang="en-US" altLang="ko-KR" sz="900" dirty="0" smtClean="0">
                 <a:latin typeface="Consolas" panose="020B0609020204030204" pitchFamily="49" charset="0"/>
               </a:rPr>
-              <a:t>...</a:t>
+              <a:t>=6 timestamp=239280418 </a:t>
             </a:r>
             <a:r>
               <a:rPr lang="en-US" altLang="ko-KR" sz="900" dirty="0" err="1" smtClean="0">
                 <a:latin typeface="Consolas" panose="020B0609020204030204" pitchFamily="49" charset="0"/>
               </a:rPr>
-              <a:t>nH</a:t>
+              <a:t>msgtype</a:t>
             </a:r>
             <a:r>
               <a:rPr lang="en-US" altLang="ko-KR" sz="900" dirty="0" smtClean="0">
                 <a:latin typeface="Consolas" panose="020B0609020204030204" pitchFamily="49" charset="0"/>
               </a:rPr>
-              <a:t>{.</a:t>
-            </a:r>
-          </a:p>
-          <a:p>
+              <a:t>=1005</a:t>
+            </a:r>
+          </a:p>
+          <a:p>
+            <a:r>
+              <a:rPr lang="en-US" altLang="ko-KR" sz="900" dirty="0" smtClean="0">
+                <a:latin typeface="Consolas" panose="020B0609020204030204" pitchFamily="49" charset="0"/>
+              </a:rPr>
+              <a:t>accumulated packets=1033   </a:t>
+            </a:r>
+            <a:r>
+              <a:rPr lang="en-US" altLang="ko-KR" sz="900" dirty="0" err="1" smtClean="0">
+                <a:latin typeface="Consolas" panose="020B0609020204030204" pitchFamily="49" charset="0"/>
+              </a:rPr>
+              <a:t>my_packet_size</a:t>
+            </a:r>
+            <a:r>
+              <a:rPr lang="en-US" altLang="ko-KR" sz="900" dirty="0" smtClean="0">
+                <a:latin typeface="Consolas" panose="020B0609020204030204" pitchFamily="49" charset="0"/>
+              </a:rPr>
+              <a:t>=6</a:t>
+            </a:r>
+          </a:p>
+          <a:p>
+            <a:r>
+              <a:rPr lang="en-US" altLang="ko-KR" sz="900" dirty="0" smtClean="0">
+                <a:latin typeface="Consolas" panose="020B0609020204030204" pitchFamily="49" charset="0"/>
+              </a:rPr>
+              <a:t>bytes=1033, data=[SB1T]</a:t>
+            </a:r>
+          </a:p>
+          <a:p>
+            <a:r>
+              <a:rPr lang="en-US" altLang="ko-KR" sz="900" dirty="0" err="1" smtClean="0">
+                <a:latin typeface="Consolas" panose="020B0609020204030204" pitchFamily="49" charset="0"/>
+              </a:rPr>
+              <a:t>pkt</a:t>
+            </a:r>
+            <a:r>
+              <a:rPr lang="en-US" altLang="ko-KR" sz="900" dirty="0" smtClean="0">
+                <a:latin typeface="Consolas" panose="020B0609020204030204" pitchFamily="49" charset="0"/>
+              </a:rPr>
+              <a:t> header : length=6  head=[SB1T]</a:t>
+            </a:r>
+          </a:p>
+          <a:p>
+            <a:r>
+              <a:rPr lang="en-US" altLang="ko-KR" sz="900" dirty="0" err="1" smtClean="0">
+                <a:latin typeface="Consolas" panose="020B0609020204030204" pitchFamily="49" charset="0"/>
+              </a:rPr>
+              <a:t>pkt</a:t>
+            </a:r>
+            <a:r>
+              <a:rPr lang="en-US" altLang="ko-KR" sz="900" dirty="0" smtClean="0">
+                <a:latin typeface="Consolas" panose="020B0609020204030204" pitchFamily="49" charset="0"/>
+              </a:rPr>
+              <a:t> header : </a:t>
+            </a:r>
+            <a:r>
+              <a:rPr lang="en-US" altLang="ko-KR" sz="900" dirty="0" err="1" smtClean="0">
+                <a:latin typeface="Consolas" panose="020B0609020204030204" pitchFamily="49" charset="0"/>
+              </a:rPr>
+              <a:t>msgtype</a:t>
+            </a:r>
+            <a:r>
+              <a:rPr lang="en-US" altLang="ko-KR" sz="900" dirty="0" smtClean="0">
+                <a:latin typeface="Consolas" panose="020B0609020204030204" pitchFamily="49" charset="0"/>
+              </a:rPr>
+              <a:t>=1005</a:t>
+            </a:r>
+          </a:p>
+          <a:p>
+            <a:r>
+              <a:rPr lang="en-US" altLang="ko-KR" sz="900" dirty="0" err="1" smtClean="0">
+                <a:latin typeface="Consolas" panose="020B0609020204030204" pitchFamily="49" charset="0"/>
+              </a:rPr>
+              <a:t>pkt</a:t>
+            </a:r>
+            <a:r>
+              <a:rPr lang="en-US" altLang="ko-KR" sz="900" dirty="0" smtClean="0">
+                <a:latin typeface="Consolas" panose="020B0609020204030204" pitchFamily="49" charset="0"/>
+              </a:rPr>
+              <a:t> header : timestamp=239280418</a:t>
+            </a:r>
+          </a:p>
+          <a:p>
+            <a:r>
+              <a:rPr lang="en-US" altLang="ko-KR" sz="900" dirty="0" err="1" smtClean="0">
+                <a:latin typeface="Consolas" panose="020B0609020204030204" pitchFamily="49" charset="0"/>
+              </a:rPr>
+              <a:t>CBaseProtocol</a:t>
+            </a:r>
+            <a:r>
+              <a:rPr lang="en-US" altLang="ko-KR" sz="900" dirty="0" smtClean="0">
+                <a:latin typeface="Consolas" panose="020B0609020204030204" pitchFamily="49" charset="0"/>
+              </a:rPr>
+              <a:t>::</a:t>
+            </a:r>
+            <a:r>
+              <a:rPr lang="en-US" altLang="ko-KR" sz="900" dirty="0" err="1" smtClean="0">
+                <a:latin typeface="Consolas" panose="020B0609020204030204" pitchFamily="49" charset="0"/>
+              </a:rPr>
+              <a:t>CBaseProtocol</a:t>
+            </a:r>
+            <a:r>
+              <a:rPr lang="en-US" altLang="ko-KR" sz="900" dirty="0" smtClean="0">
+                <a:latin typeface="Consolas" panose="020B0609020204030204" pitchFamily="49" charset="0"/>
+              </a:rPr>
+              <a:t>() </a:t>
+            </a:r>
+            <a:r>
+              <a:rPr lang="en-US" altLang="ko-KR" sz="900" dirty="0" err="1" smtClean="0">
+                <a:latin typeface="Consolas" panose="020B0609020204030204" pitchFamily="49" charset="0"/>
+              </a:rPr>
+              <a:t>pmsg</a:t>
+            </a:r>
+            <a:r>
+              <a:rPr lang="en-US" altLang="ko-KR" sz="900" dirty="0" smtClean="0">
+                <a:latin typeface="Consolas" panose="020B0609020204030204" pitchFamily="49" charset="0"/>
+              </a:rPr>
+              <a:t>=0x0x7f5c1024d8</a:t>
+            </a:r>
+          </a:p>
+          <a:p>
+            <a:r>
+              <a:rPr lang="en-US" altLang="ko-KR" sz="900" dirty="0" err="1" smtClean="0">
+                <a:latin typeface="Consolas" panose="020B0609020204030204" pitchFamily="49" charset="0"/>
+              </a:rPr>
+              <a:t>CBaseProtocol</a:t>
+            </a:r>
+            <a:r>
+              <a:rPr lang="en-US" altLang="ko-KR" sz="900" dirty="0" smtClean="0">
+                <a:latin typeface="Consolas" panose="020B0609020204030204" pitchFamily="49" charset="0"/>
+              </a:rPr>
+              <a:t>::</a:t>
+            </a:r>
+            <a:r>
+              <a:rPr lang="en-US" altLang="ko-KR" sz="900" dirty="0" err="1" smtClean="0">
+                <a:latin typeface="Consolas" panose="020B0609020204030204" pitchFamily="49" charset="0"/>
+              </a:rPr>
+              <a:t>deSerialize</a:t>
+            </a:r>
+            <a:r>
+              <a:rPr lang="en-US" altLang="ko-KR" sz="900" dirty="0" smtClean="0">
+                <a:latin typeface="Consolas" panose="020B0609020204030204" pitchFamily="49" charset="0"/>
+              </a:rPr>
+              <a:t>()+</a:t>
+            </a:r>
+          </a:p>
+          <a:p>
+            <a:r>
+              <a:rPr lang="en-US" altLang="ko-KR" sz="900" dirty="0" smtClean="0">
+                <a:latin typeface="Consolas" panose="020B0609020204030204" pitchFamily="49" charset="0"/>
+              </a:rPr>
+              <a:t>[</a:t>
+            </a:r>
+            <a:r>
+              <a:rPr lang="en-US" altLang="ko-KR" sz="900" dirty="0" err="1" smtClean="0">
+                <a:latin typeface="Consolas" panose="020B0609020204030204" pitchFamily="49" charset="0"/>
+              </a:rPr>
+              <a:t>libprotobuf</a:t>
+            </a:r>
+            <a:r>
+              <a:rPr lang="en-US" altLang="ko-KR" sz="900" dirty="0" smtClean="0">
+                <a:latin typeface="Consolas" panose="020B0609020204030204" pitchFamily="49" charset="0"/>
+              </a:rPr>
+              <a:t> FATAL google/</a:t>
+            </a:r>
+            <a:r>
+              <a:rPr lang="en-US" altLang="ko-KR" sz="900" dirty="0" err="1" smtClean="0">
+                <a:latin typeface="Consolas" panose="020B0609020204030204" pitchFamily="49" charset="0"/>
+              </a:rPr>
+              <a:t>protobuf</a:t>
+            </a:r>
+            <a:r>
+              <a:rPr lang="en-US" altLang="ko-KR" sz="900" dirty="0" smtClean="0">
+                <a:latin typeface="Consolas" panose="020B0609020204030204" pitchFamily="49" charset="0"/>
+              </a:rPr>
+              <a:t>/stubs/stringpiece.cc:50] size too big: 18446744073709551606 details: string length exceeds max size</a:t>
+            </a:r>
+          </a:p>
+          <a:p>
+            <a:r>
+              <a:rPr lang="en-US" altLang="ko-KR" sz="900" dirty="0" smtClean="0">
+                <a:latin typeface="Consolas" panose="020B0609020204030204" pitchFamily="49" charset="0"/>
+              </a:rPr>
+              <a:t>terminate called after throwing an instance of 'google::</a:t>
+            </a:r>
+            <a:r>
+              <a:rPr lang="en-US" altLang="ko-KR" sz="900" dirty="0" err="1" smtClean="0">
+                <a:latin typeface="Consolas" panose="020B0609020204030204" pitchFamily="49" charset="0"/>
+              </a:rPr>
+              <a:t>protobuf</a:t>
+            </a:r>
+            <a:r>
+              <a:rPr lang="en-US" altLang="ko-KR" sz="900" dirty="0" smtClean="0">
+                <a:latin typeface="Consolas" panose="020B0609020204030204" pitchFamily="49" charset="0"/>
+              </a:rPr>
+              <a:t>::</a:t>
+            </a:r>
+            <a:r>
+              <a:rPr lang="en-US" altLang="ko-KR" sz="900" dirty="0" err="1" smtClean="0">
+                <a:latin typeface="Consolas" panose="020B0609020204030204" pitchFamily="49" charset="0"/>
+              </a:rPr>
+              <a:t>FatalException</a:t>
+            </a:r>
+            <a:r>
+              <a:rPr lang="en-US" altLang="ko-KR" sz="900" dirty="0" smtClean="0">
+                <a:latin typeface="Consolas" panose="020B0609020204030204" pitchFamily="49" charset="0"/>
+              </a:rPr>
+              <a:t>'</a:t>
+            </a:r>
+          </a:p>
+          <a:p>
+            <a:r>
+              <a:rPr lang="en-US" altLang="ko-KR" sz="900" dirty="0" smtClean="0">
+                <a:latin typeface="Consolas" panose="020B0609020204030204" pitchFamily="49" charset="0"/>
+              </a:rPr>
+              <a:t>  what():  size too big: 18446744073709551606 details: string length exceeds max size</a:t>
+            </a:r>
+          </a:p>
+          <a:p>
+            <a:r>
+              <a:rPr lang="en-US" altLang="ko-KR" sz="900" dirty="0" smtClean="0">
+                <a:latin typeface="Consolas" panose="020B0609020204030204" pitchFamily="49" charset="0"/>
+              </a:rPr>
+              <a:t>Aborted</a:t>
+            </a:r>
             <a:endParaRPr lang="en-US" altLang="ko-KR" sz="900" dirty="0" smtClean="0">
               <a:latin typeface="Consolas" panose="020B0609020204030204" pitchFamily="49" charset="0"/>
             </a:endParaRPr>
           </a:p>
+        </p:txBody>
+      </p:sp>
+      <p:sp>
+        <p:nvSpPr>
+          <p:cNvPr id="25" name="직사각형 24"/>
+          <p:cNvSpPr/>
+          <p:nvPr/>
+        </p:nvSpPr>
+        <p:spPr>
+          <a:xfrm>
+            <a:off x="6524609" y="4013818"/>
+            <a:ext cx="4878101" cy="2585323"/>
+          </a:xfrm>
+          <a:prstGeom prst="rect">
+            <a:avLst/>
+          </a:prstGeom>
+          <a:ln>
+            <a:solidFill>
+              <a:schemeClr val="bg1">
+                <a:lumMod val="75000"/>
+              </a:schemeClr>
+            </a:solidFill>
+          </a:ln>
+        </p:spPr>
+        <p:txBody>
+          <a:bodyPr wrap="square">
+            <a:spAutoFit/>
+          </a:bodyPr>
+          <a:lstStyle/>
           <a:p>
             <a:r>
               <a:rPr lang="en-US" altLang="ko-KR" sz="900" dirty="0" smtClean="0">
                 <a:latin typeface="Consolas" panose="020B0609020204030204" pitchFamily="49" charset="0"/>
               </a:rPr>
-              <a:t>[pkt_0000000021]</a:t>
+              <a:t>$ python3 fuzz_tartan.py</a:t>
+            </a:r>
+          </a:p>
+          <a:p>
+            <a:r>
+              <a:rPr lang="en-US" altLang="ko-KR" sz="900" dirty="0" smtClean="0">
+                <a:latin typeface="Consolas" panose="020B0609020204030204" pitchFamily="49" charset="0"/>
+              </a:rPr>
+              <a:t>...</a:t>
+            </a:r>
+          </a:p>
+          <a:p>
+            <a:endParaRPr lang="en-US" altLang="ko-KR" sz="900" dirty="0" smtClean="0">
+              <a:latin typeface="Consolas" panose="020B0609020204030204" pitchFamily="49" charset="0"/>
+            </a:endParaRPr>
+          </a:p>
+          <a:p>
+            <a:endParaRPr lang="en-US" altLang="ko-KR" sz="900" dirty="0" smtClean="0">
+              <a:latin typeface="Consolas" panose="020B0609020204030204" pitchFamily="49" charset="0"/>
+            </a:endParaRPr>
+          </a:p>
+          <a:p>
+            <a:r>
+              <a:rPr lang="en-US" altLang="ko-KR" sz="900" dirty="0" smtClean="0">
+                <a:latin typeface="Consolas" panose="020B0609020204030204" pitchFamily="49" charset="0"/>
+              </a:rPr>
+              <a:t>[pkt_0000000020]</a:t>
+            </a:r>
+          </a:p>
+          <a:p>
+            <a:r>
+              <a:rPr lang="en-US" altLang="ko-KR" sz="900" dirty="0" smtClean="0">
+                <a:latin typeface="Consolas" panose="020B0609020204030204" pitchFamily="49" charset="0"/>
+              </a:rPr>
+              <a:t>0000  53 42 31 54 19 00 00 00 B1 8C 20 62 E9 03 00 00  SB1T...... b....</a:t>
+            </a:r>
+          </a:p>
+          <a:p>
+            <a:r>
+              <a:rPr lang="en-US" altLang="ko-KR" sz="900" dirty="0" smtClean="0">
+                <a:latin typeface="Consolas" panose="020B0609020204030204" pitchFamily="49" charset="0"/>
+              </a:rPr>
+              <a:t>0010  9F 20 06 42 09 DF D9 B9 0C 5B 14 46 34 73 7E 2D  . .B.....[.F4s~-</a:t>
+            </a:r>
+          </a:p>
+          <a:p>
+            <a:r>
+              <a:rPr lang="en-US" altLang="ko-KR" sz="900" dirty="0" smtClean="0">
+                <a:latin typeface="Consolas" panose="020B0609020204030204" pitchFamily="49" charset="0"/>
+              </a:rPr>
+              <a:t>0020  4C 6A FB 9C A4 6E 48 7B C5                       </a:t>
+            </a:r>
+            <a:r>
+              <a:rPr lang="en-US" altLang="ko-KR" sz="900" dirty="0" err="1" smtClean="0">
+                <a:latin typeface="Consolas" panose="020B0609020204030204" pitchFamily="49" charset="0"/>
+              </a:rPr>
+              <a:t>Lj</a:t>
+            </a:r>
+            <a:r>
+              <a:rPr lang="en-US" altLang="ko-KR" sz="900" dirty="0" smtClean="0">
+                <a:latin typeface="Consolas" panose="020B0609020204030204" pitchFamily="49" charset="0"/>
+              </a:rPr>
+              <a:t>...</a:t>
+            </a:r>
+            <a:r>
+              <a:rPr lang="en-US" altLang="ko-KR" sz="900" dirty="0" err="1" smtClean="0">
+                <a:latin typeface="Consolas" panose="020B0609020204030204" pitchFamily="49" charset="0"/>
+              </a:rPr>
+              <a:t>nH</a:t>
+            </a:r>
+            <a:r>
+              <a:rPr lang="en-US" altLang="ko-KR" sz="900" dirty="0" smtClean="0">
+                <a:latin typeface="Consolas" panose="020B0609020204030204" pitchFamily="49" charset="0"/>
+              </a:rPr>
+              <a:t>{.</a:t>
+            </a:r>
+          </a:p>
+          <a:p>
+            <a:endParaRPr lang="en-US" altLang="ko-KR" sz="900" dirty="0" smtClean="0">
+              <a:latin typeface="Consolas" panose="020B0609020204030204" pitchFamily="49" charset="0"/>
+            </a:endParaRPr>
+          </a:p>
+          <a:p>
+            <a:r>
+              <a:rPr lang="en-US" altLang="ko-KR" sz="900" dirty="0" smtClean="0">
+                <a:latin typeface="Consolas" panose="020B0609020204030204" pitchFamily="49" charset="0"/>
+              </a:rPr>
+              <a:t>[</a:t>
+            </a:r>
+            <a:r>
+              <a:rPr lang="en-US" altLang="ko-KR" sz="900" b="1" u="sng" dirty="0" smtClean="0">
+                <a:solidFill>
+                  <a:srgbClr val="FF0000"/>
+                </a:solidFill>
+                <a:latin typeface="Consolas" panose="020B0609020204030204" pitchFamily="49" charset="0"/>
+              </a:rPr>
+              <a:t>pkt_0000000021</a:t>
+            </a:r>
+            <a:r>
+              <a:rPr lang="en-US" altLang="ko-KR" sz="900" dirty="0" smtClean="0">
+                <a:latin typeface="Consolas" panose="020B0609020204030204" pitchFamily="49" charset="0"/>
+              </a:rPr>
+              <a:t>]</a:t>
             </a:r>
           </a:p>
           <a:p>
@@ -8457,7 +8455,7 @@
         <p:spPr>
           <a:xfrm>
             <a:off x="458759" y="3743340"/>
-            <a:ext cx="1134093" cy="276999"/>
+            <a:ext cx="5636864" cy="276999"/>
           </a:xfrm>
           <a:prstGeom prst="rect">
             <a:avLst/>
@@ -8472,7 +8470,11 @@
           <a:p>
             <a:r>
               <a:rPr lang="en-US" altLang="ko-KR" sz="1200" b="1" dirty="0" smtClean="0"/>
-              <a:t>Crash Type 2</a:t>
+              <a:t>Crash Type </a:t>
+            </a:r>
+            <a:r>
+              <a:rPr lang="en-US" altLang="ko-KR" sz="1200" b="1" dirty="0"/>
+              <a:t>2 = V12 Crash by Integer Underflow related in the packet size</a:t>
             </a:r>
             <a:endParaRPr lang="ko-KR" altLang="en-US" sz="1200" b="1" dirty="0"/>
           </a:p>
@@ -8530,14 +8532,14 @@
                 <a:gridCol w="1787600">
                   <a:extLst>
                     <a:ext uri="{9D8B030D-6E8A-4147-A177-3AD203B41FA5}">
-                      <a16:colId xmlns:a16="http://schemas.microsoft.com/office/drawing/2014/main" xmlns="" val="20000"/>
+                      <a16:colId xmlns="" xmlns:a16="http://schemas.microsoft.com/office/drawing/2014/main" val="20000"/>
                     </a:ext>
                   </a:extLst>
                 </a:gridCol>
                 <a:gridCol w="3131350">
                   <a:extLst>
                     <a:ext uri="{9D8B030D-6E8A-4147-A177-3AD203B41FA5}">
-                      <a16:colId xmlns:a16="http://schemas.microsoft.com/office/drawing/2014/main" xmlns="" val="20001"/>
+                      <a16:colId xmlns="" xmlns:a16="http://schemas.microsoft.com/office/drawing/2014/main" val="20001"/>
                     </a:ext>
                   </a:extLst>
                 </a:gridCol>
@@ -8586,7 +8588,7 @@
                 </a:tc>
                 <a:extLst>
                   <a:ext uri="{0D108BD9-81ED-4DB2-BD59-A6C34878D82A}">
-                    <a16:rowId xmlns:a16="http://schemas.microsoft.com/office/drawing/2014/main" xmlns="" val="10000"/>
+                    <a16:rowId xmlns="" xmlns:a16="http://schemas.microsoft.com/office/drawing/2014/main" val="10000"/>
                   </a:ext>
                 </a:extLst>
               </a:tr>
@@ -8655,7 +8657,7 @@
                 </a:tc>
                 <a:extLst>
                   <a:ext uri="{0D108BD9-81ED-4DB2-BD59-A6C34878D82A}">
-                    <a16:rowId xmlns:a16="http://schemas.microsoft.com/office/drawing/2014/main" xmlns="" val="10001"/>
+                    <a16:rowId xmlns="" xmlns:a16="http://schemas.microsoft.com/office/drawing/2014/main" val="10001"/>
                   </a:ext>
                 </a:extLst>
               </a:tr>
@@ -8724,7 +8726,7 @@
                 </a:tc>
                 <a:extLst>
                   <a:ext uri="{0D108BD9-81ED-4DB2-BD59-A6C34878D82A}">
-                    <a16:rowId xmlns:a16="http://schemas.microsoft.com/office/drawing/2014/main" xmlns="" val="10002"/>
+                    <a16:rowId xmlns="" xmlns:a16="http://schemas.microsoft.com/office/drawing/2014/main" val="10002"/>
                   </a:ext>
                 </a:extLst>
               </a:tr>
@@ -8793,7 +8795,7 @@
                 </a:tc>
                 <a:extLst>
                   <a:ext uri="{0D108BD9-81ED-4DB2-BD59-A6C34878D82A}">
-                    <a16:rowId xmlns:a16="http://schemas.microsoft.com/office/drawing/2014/main" xmlns="" val="10003"/>
+                    <a16:rowId xmlns="" xmlns:a16="http://schemas.microsoft.com/office/drawing/2014/main" val="10003"/>
                   </a:ext>
                 </a:extLst>
               </a:tr>
@@ -8862,7 +8864,7 @@
                 </a:tc>
                 <a:extLst>
                   <a:ext uri="{0D108BD9-81ED-4DB2-BD59-A6C34878D82A}">
-                    <a16:rowId xmlns:a16="http://schemas.microsoft.com/office/drawing/2014/main" xmlns="" val="10004"/>
+                    <a16:rowId xmlns="" xmlns:a16="http://schemas.microsoft.com/office/drawing/2014/main" val="10004"/>
                   </a:ext>
                 </a:extLst>
               </a:tr>
@@ -8931,7 +8933,7 @@
                 </a:tc>
                 <a:extLst>
                   <a:ext uri="{0D108BD9-81ED-4DB2-BD59-A6C34878D82A}">
-                    <a16:rowId xmlns:a16="http://schemas.microsoft.com/office/drawing/2014/main" xmlns="" val="10005"/>
+                    <a16:rowId xmlns="" xmlns:a16="http://schemas.microsoft.com/office/drawing/2014/main" val="10005"/>
                   </a:ext>
                 </a:extLst>
               </a:tr>
@@ -9000,7 +9002,7 @@
                 </a:tc>
                 <a:extLst>
                   <a:ext uri="{0D108BD9-81ED-4DB2-BD59-A6C34878D82A}">
-                    <a16:rowId xmlns:a16="http://schemas.microsoft.com/office/drawing/2014/main" xmlns="" val="10006"/>
+                    <a16:rowId xmlns="" xmlns:a16="http://schemas.microsoft.com/office/drawing/2014/main" val="10006"/>
                   </a:ext>
                 </a:extLst>
               </a:tr>
@@ -9069,7 +9071,7 @@
                 </a:tc>
                 <a:extLst>
                   <a:ext uri="{0D108BD9-81ED-4DB2-BD59-A6C34878D82A}">
-                    <a16:rowId xmlns:a16="http://schemas.microsoft.com/office/drawing/2014/main" xmlns="" val="10007"/>
+                    <a16:rowId xmlns="" xmlns:a16="http://schemas.microsoft.com/office/drawing/2014/main" val="10007"/>
                   </a:ext>
                 </a:extLst>
               </a:tr>
@@ -9138,7 +9140,7 @@
                 </a:tc>
                 <a:extLst>
                   <a:ext uri="{0D108BD9-81ED-4DB2-BD59-A6C34878D82A}">
-                    <a16:rowId xmlns:a16="http://schemas.microsoft.com/office/drawing/2014/main" xmlns="" val="10008"/>
+                    <a16:rowId xmlns="" xmlns:a16="http://schemas.microsoft.com/office/drawing/2014/main" val="10008"/>
                   </a:ext>
                 </a:extLst>
               </a:tr>
@@ -9172,7 +9174,7 @@
                 <a:gridCol w="2201325">
                   <a:extLst>
                     <a:ext uri="{9D8B030D-6E8A-4147-A177-3AD203B41FA5}">
-                      <a16:colId xmlns:a16="http://schemas.microsoft.com/office/drawing/2014/main" xmlns="" val="20000"/>
+                      <a16:colId xmlns="" xmlns:a16="http://schemas.microsoft.com/office/drawing/2014/main" val="20000"/>
                     </a:ext>
                   </a:extLst>
                 </a:gridCol>
@@ -9211,7 +9213,7 @@
                 </a:tc>
                 <a:extLst>
                   <a:ext uri="{0D108BD9-81ED-4DB2-BD59-A6C34878D82A}">
-                    <a16:rowId xmlns:a16="http://schemas.microsoft.com/office/drawing/2014/main" xmlns="" val="10000"/>
+                    <a16:rowId xmlns="" xmlns:a16="http://schemas.microsoft.com/office/drawing/2014/main" val="10000"/>
                   </a:ext>
                 </a:extLst>
               </a:tr>
@@ -9249,7 +9251,7 @@
                 </a:tc>
                 <a:extLst>
                   <a:ext uri="{0D108BD9-81ED-4DB2-BD59-A6C34878D82A}">
-                    <a16:rowId xmlns:a16="http://schemas.microsoft.com/office/drawing/2014/main" xmlns="" val="10001"/>
+                    <a16:rowId xmlns="" xmlns:a16="http://schemas.microsoft.com/office/drawing/2014/main" val="10001"/>
                   </a:ext>
                 </a:extLst>
               </a:tr>
@@ -9287,7 +9289,7 @@
                 </a:tc>
                 <a:extLst>
                   <a:ext uri="{0D108BD9-81ED-4DB2-BD59-A6C34878D82A}">
-                    <a16:rowId xmlns:a16="http://schemas.microsoft.com/office/drawing/2014/main" xmlns="" val="10002"/>
+                    <a16:rowId xmlns="" xmlns:a16="http://schemas.microsoft.com/office/drawing/2014/main" val="10002"/>
                   </a:ext>
                 </a:extLst>
               </a:tr>
@@ -9329,7 +9331,7 @@
                 </a:tc>
                 <a:extLst>
                   <a:ext uri="{0D108BD9-81ED-4DB2-BD59-A6C34878D82A}">
-                    <a16:rowId xmlns:a16="http://schemas.microsoft.com/office/drawing/2014/main" xmlns="" val="10003"/>
+                    <a16:rowId xmlns="" xmlns:a16="http://schemas.microsoft.com/office/drawing/2014/main" val="10003"/>
                   </a:ext>
                 </a:extLst>
               </a:tr>
@@ -9371,7 +9373,7 @@
                 </a:tc>
                 <a:extLst>
                   <a:ext uri="{0D108BD9-81ED-4DB2-BD59-A6C34878D82A}">
-                    <a16:rowId xmlns:a16="http://schemas.microsoft.com/office/drawing/2014/main" xmlns="" val="10004"/>
+                    <a16:rowId xmlns="" xmlns:a16="http://schemas.microsoft.com/office/drawing/2014/main" val="10004"/>
                   </a:ext>
                 </a:extLst>
               </a:tr>
@@ -9413,7 +9415,7 @@
                 </a:tc>
                 <a:extLst>
                   <a:ext uri="{0D108BD9-81ED-4DB2-BD59-A6C34878D82A}">
-                    <a16:rowId xmlns:a16="http://schemas.microsoft.com/office/drawing/2014/main" xmlns="" val="10005"/>
+                    <a16:rowId xmlns="" xmlns:a16="http://schemas.microsoft.com/office/drawing/2014/main" val="10005"/>
                   </a:ext>
                 </a:extLst>
               </a:tr>
@@ -9455,7 +9457,7 @@
                 </a:tc>
                 <a:extLst>
                   <a:ext uri="{0D108BD9-81ED-4DB2-BD59-A6C34878D82A}">
-                    <a16:rowId xmlns:a16="http://schemas.microsoft.com/office/drawing/2014/main" xmlns="" val="10006"/>
+                    <a16:rowId xmlns="" xmlns:a16="http://schemas.microsoft.com/office/drawing/2014/main" val="10006"/>
                   </a:ext>
                 </a:extLst>
               </a:tr>
@@ -9501,7 +9503,7 @@
                 </a:tc>
                 <a:extLst>
                   <a:ext uri="{0D108BD9-81ED-4DB2-BD59-A6C34878D82A}">
-                    <a16:rowId xmlns:a16="http://schemas.microsoft.com/office/drawing/2014/main" xmlns="" val="10007"/>
+                    <a16:rowId xmlns="" xmlns:a16="http://schemas.microsoft.com/office/drawing/2014/main" val="10007"/>
                   </a:ext>
                 </a:extLst>
               </a:tr>
@@ -9551,7 +9553,7 @@
                 </a:tc>
                 <a:extLst>
                   <a:ext uri="{0D108BD9-81ED-4DB2-BD59-A6C34878D82A}">
-                    <a16:rowId xmlns:a16="http://schemas.microsoft.com/office/drawing/2014/main" xmlns="" val="10008"/>
+                    <a16:rowId xmlns="" xmlns:a16="http://schemas.microsoft.com/office/drawing/2014/main" val="10008"/>
                   </a:ext>
                 </a:extLst>
               </a:tr>
@@ -9581,7 +9583,7 @@
                 <a:gridCol w="1012050">
                   <a:extLst>
                     <a:ext uri="{9D8B030D-6E8A-4147-A177-3AD203B41FA5}">
-                      <a16:colId xmlns:a16="http://schemas.microsoft.com/office/drawing/2014/main" xmlns="" val="20000"/>
+                      <a16:colId xmlns="" xmlns:a16="http://schemas.microsoft.com/office/drawing/2014/main" val="20000"/>
                     </a:ext>
                   </a:extLst>
                 </a:gridCol>
@@ -9620,7 +9622,7 @@
                 </a:tc>
                 <a:extLst>
                   <a:ext uri="{0D108BD9-81ED-4DB2-BD59-A6C34878D82A}">
-                    <a16:rowId xmlns:a16="http://schemas.microsoft.com/office/drawing/2014/main" xmlns="" val="10000"/>
+                    <a16:rowId xmlns="" xmlns:a16="http://schemas.microsoft.com/office/drawing/2014/main" val="10000"/>
                   </a:ext>
                 </a:extLst>
               </a:tr>
@@ -9658,7 +9660,7 @@
                 </a:tc>
                 <a:extLst>
                   <a:ext uri="{0D108BD9-81ED-4DB2-BD59-A6C34878D82A}">
-                    <a16:rowId xmlns:a16="http://schemas.microsoft.com/office/drawing/2014/main" xmlns="" val="10001"/>
+                    <a16:rowId xmlns="" xmlns:a16="http://schemas.microsoft.com/office/drawing/2014/main" val="10001"/>
                   </a:ext>
                 </a:extLst>
               </a:tr>

</xml_diff>